<commit_message>
updates to week5 & 6 SDA
</commit_message>
<xml_diff>
--- a/static/files/SDA/week6/lecture_week_6.pptx
+++ b/static/files/SDA/week6/lecture_week_6.pptx
@@ -5,10 +5,10 @@
     <p:sldMasterId id="2147483648" r:id="rId1"/>
   </p:sldMasterIdLst>
   <p:notesMasterIdLst>
-    <p:notesMasterId r:id="rId24"/>
+    <p:notesMasterId r:id="rId23"/>
   </p:notesMasterIdLst>
   <p:handoutMasterIdLst>
-    <p:handoutMasterId r:id="rId25"/>
+    <p:handoutMasterId r:id="rId24"/>
   </p:handoutMasterIdLst>
   <p:sldIdLst>
     <p:sldId id="256" r:id="rId2"/>
@@ -22,17 +22,16 @@
     <p:sldId id="345" r:id="rId10"/>
     <p:sldId id="267" r:id="rId11"/>
     <p:sldId id="268" r:id="rId12"/>
-    <p:sldId id="269" r:id="rId13"/>
-    <p:sldId id="258" r:id="rId14"/>
-    <p:sldId id="259" r:id="rId15"/>
-    <p:sldId id="260" r:id="rId16"/>
-    <p:sldId id="261" r:id="rId17"/>
-    <p:sldId id="262" r:id="rId18"/>
-    <p:sldId id="263" r:id="rId19"/>
-    <p:sldId id="264" r:id="rId20"/>
-    <p:sldId id="265" r:id="rId21"/>
-    <p:sldId id="266" r:id="rId22"/>
-    <p:sldId id="343" r:id="rId23"/>
+    <p:sldId id="258" r:id="rId13"/>
+    <p:sldId id="259" r:id="rId14"/>
+    <p:sldId id="260" r:id="rId15"/>
+    <p:sldId id="261" r:id="rId16"/>
+    <p:sldId id="262" r:id="rId17"/>
+    <p:sldId id="263" r:id="rId18"/>
+    <p:sldId id="264" r:id="rId19"/>
+    <p:sldId id="265" r:id="rId20"/>
+    <p:sldId id="266" r:id="rId21"/>
+    <p:sldId id="343" r:id="rId22"/>
   </p:sldIdLst>
   <p:sldSz cx="9144000" cy="6858000" type="screen4x3"/>
   <p:notesSz cx="7099300" cy="10234613"/>
@@ -235,7 +234,7 @@
           <a:p>
             <a:fld id="{3B8A617B-FAA8-1E48-8156-1D6172B8852C}" type="datetimeFigureOut">
               <a:rPr lang="nl-NL" smtClean="0"/>
-              <a:t>3-10-2021</a:t>
+              <a:t>09-10-2022</a:t>
             </a:fld>
             <a:endParaRPr lang="nl-NL"/>
           </a:p>
@@ -301,7 +300,7 @@
           <a:p>
             <a:fld id="{D27C5232-E044-E44C-8FF9-E90723E46FB4}" type="slidenum">
               <a:rPr lang="nl-NL" smtClean="0"/>
-              <a:t>‹#›</a:t>
+              <a:t>‹nr.›</a:t>
             </a:fld>
             <a:endParaRPr lang="nl-NL"/>
           </a:p>
@@ -400,7 +399,7 @@
           <a:p>
             <a:fld id="{56D60B32-5B67-473F-876B-A5A6D7E667CA}" type="datetimeFigureOut">
               <a:rPr lang="nl-NL" smtClean="0"/>
-              <a:t>3-10-2021</a:t>
+              <a:t>09-10-2022</a:t>
             </a:fld>
             <a:endParaRPr lang="nl-NL"/>
           </a:p>
@@ -559,7 +558,7 @@
           <a:p>
             <a:fld id="{5E7434FA-B6DC-4B72-BAA4-3DD9D5C1E254}" type="slidenum">
               <a:rPr lang="nl-NL" smtClean="0"/>
-              <a:t>‹#›</a:t>
+              <a:t>‹nr.›</a:t>
             </a:fld>
             <a:endParaRPr lang="nl-NL"/>
           </a:p>
@@ -733,7 +732,7 @@
           <a:p>
             <a:fld id="{E6F94ABF-C5AA-624B-B3F8-A436392B2D11}" type="slidenum">
               <a:rPr lang="nl-NL" smtClean="0"/>
-              <a:t>14</a:t>
+              <a:t>13</a:t>
             </a:fld>
             <a:endParaRPr lang="nl-NL"/>
           </a:p>
@@ -933,7 +932,7 @@
           <a:p>
             <a:fld id="{195EC7EE-1FA3-A547-B0AD-1B20D01AB2D7}" type="datetime1">
               <a:rPr lang="nl-NL" smtClean="0"/>
-              <a:t>3-10-2021</a:t>
+              <a:t>09-10-2022</a:t>
             </a:fld>
             <a:endParaRPr lang="nl-NL"/>
           </a:p>
@@ -975,7 +974,7 @@
           <a:p>
             <a:fld id="{020E0409-E04F-4430-A784-C1A9179F1034}" type="slidenum">
               <a:rPr lang="nl-NL" smtClean="0"/>
-              <a:t>‹#›</a:t>
+              <a:t>‹nr.›</a:t>
             </a:fld>
             <a:endParaRPr lang="nl-NL"/>
           </a:p>
@@ -1103,7 +1102,7 @@
           <a:p>
             <a:fld id="{270D9A64-97D9-2D43-9C88-501C444B6E84}" type="datetime1">
               <a:rPr lang="nl-NL" smtClean="0"/>
-              <a:t>3-10-2021</a:t>
+              <a:t>09-10-2022</a:t>
             </a:fld>
             <a:endParaRPr lang="nl-NL"/>
           </a:p>
@@ -1145,7 +1144,7 @@
           <a:p>
             <a:fld id="{020E0409-E04F-4430-A784-C1A9179F1034}" type="slidenum">
               <a:rPr lang="nl-NL" smtClean="0"/>
-              <a:t>‹#›</a:t>
+              <a:t>‹nr.›</a:t>
             </a:fld>
             <a:endParaRPr lang="nl-NL"/>
           </a:p>
@@ -1283,7 +1282,7 @@
           <a:p>
             <a:fld id="{C0DB5813-2B96-0642-847C-4D37EBCCA20C}" type="datetime1">
               <a:rPr lang="nl-NL" smtClean="0"/>
-              <a:t>3-10-2021</a:t>
+              <a:t>09-10-2022</a:t>
             </a:fld>
             <a:endParaRPr lang="nl-NL"/>
           </a:p>
@@ -1325,7 +1324,7 @@
           <a:p>
             <a:fld id="{020E0409-E04F-4430-A784-C1A9179F1034}" type="slidenum">
               <a:rPr lang="nl-NL" smtClean="0"/>
-              <a:t>‹#›</a:t>
+              <a:t>‹nr.›</a:t>
             </a:fld>
             <a:endParaRPr lang="nl-NL"/>
           </a:p>
@@ -1453,7 +1452,7 @@
           <a:p>
             <a:fld id="{439814C6-EC19-3C40-B251-65022B811312}" type="datetime1">
               <a:rPr lang="nl-NL" smtClean="0"/>
-              <a:t>3-10-2021</a:t>
+              <a:t>09-10-2022</a:t>
             </a:fld>
             <a:endParaRPr lang="nl-NL"/>
           </a:p>
@@ -1495,7 +1494,7 @@
           <a:p>
             <a:fld id="{020E0409-E04F-4430-A784-C1A9179F1034}" type="slidenum">
               <a:rPr lang="nl-NL" smtClean="0"/>
-              <a:t>‹#›</a:t>
+              <a:t>‹nr.›</a:t>
             </a:fld>
             <a:endParaRPr lang="nl-NL"/>
           </a:p>
@@ -1699,7 +1698,7 @@
           <a:p>
             <a:fld id="{6B61BD80-E3A8-5F44-924E-39E96A33997F}" type="datetime1">
               <a:rPr lang="nl-NL" smtClean="0"/>
-              <a:t>3-10-2021</a:t>
+              <a:t>09-10-2022</a:t>
             </a:fld>
             <a:endParaRPr lang="nl-NL"/>
           </a:p>
@@ -1741,7 +1740,7 @@
           <a:p>
             <a:fld id="{020E0409-E04F-4430-A784-C1A9179F1034}" type="slidenum">
               <a:rPr lang="nl-NL" smtClean="0"/>
-              <a:t>‹#›</a:t>
+              <a:t>‹nr.›</a:t>
             </a:fld>
             <a:endParaRPr lang="nl-NL"/>
           </a:p>
@@ -1987,7 +1986,7 @@
           <a:p>
             <a:fld id="{E9E8C907-2DC5-DF4D-B001-C5B05E023ADE}" type="datetime1">
               <a:rPr lang="nl-NL" smtClean="0"/>
-              <a:t>3-10-2021</a:t>
+              <a:t>09-10-2022</a:t>
             </a:fld>
             <a:endParaRPr lang="nl-NL"/>
           </a:p>
@@ -2029,7 +2028,7 @@
           <a:p>
             <a:fld id="{020E0409-E04F-4430-A784-C1A9179F1034}" type="slidenum">
               <a:rPr lang="nl-NL" smtClean="0"/>
-              <a:t>‹#›</a:t>
+              <a:t>‹nr.›</a:t>
             </a:fld>
             <a:endParaRPr lang="nl-NL"/>
           </a:p>
@@ -2409,7 +2408,7 @@
           <a:p>
             <a:fld id="{F58EC84D-735C-9C47-936C-433C1FDD2406}" type="datetime1">
               <a:rPr lang="nl-NL" smtClean="0"/>
-              <a:t>3-10-2021</a:t>
+              <a:t>09-10-2022</a:t>
             </a:fld>
             <a:endParaRPr lang="nl-NL"/>
           </a:p>
@@ -2451,7 +2450,7 @@
           <a:p>
             <a:fld id="{020E0409-E04F-4430-A784-C1A9179F1034}" type="slidenum">
               <a:rPr lang="nl-NL" smtClean="0"/>
-              <a:t>‹#›</a:t>
+              <a:t>‹nr.›</a:t>
             </a:fld>
             <a:endParaRPr lang="nl-NL"/>
           </a:p>
@@ -2527,7 +2526,7 @@
           <a:p>
             <a:fld id="{607132DF-B754-2C40-ABBC-1487DD57F43D}" type="datetime1">
               <a:rPr lang="nl-NL" smtClean="0"/>
-              <a:t>3-10-2021</a:t>
+              <a:t>09-10-2022</a:t>
             </a:fld>
             <a:endParaRPr lang="nl-NL"/>
           </a:p>
@@ -2569,7 +2568,7 @@
           <a:p>
             <a:fld id="{020E0409-E04F-4430-A784-C1A9179F1034}" type="slidenum">
               <a:rPr lang="nl-NL" smtClean="0"/>
-              <a:t>‹#›</a:t>
+              <a:t>‹nr.›</a:t>
             </a:fld>
             <a:endParaRPr lang="nl-NL"/>
           </a:p>
@@ -2622,7 +2621,7 @@
           <a:p>
             <a:fld id="{7389D038-1725-EB43-9218-4BE590D875B0}" type="datetime1">
               <a:rPr lang="nl-NL" smtClean="0"/>
-              <a:t>3-10-2021</a:t>
+              <a:t>09-10-2022</a:t>
             </a:fld>
             <a:endParaRPr lang="nl-NL"/>
           </a:p>
@@ -2664,7 +2663,7 @@
           <a:p>
             <a:fld id="{020E0409-E04F-4430-A784-C1A9179F1034}" type="slidenum">
               <a:rPr lang="nl-NL" smtClean="0"/>
-              <a:t>‹#›</a:t>
+              <a:t>‹nr.›</a:t>
             </a:fld>
             <a:endParaRPr lang="nl-NL"/>
           </a:p>
@@ -2899,7 +2898,7 @@
           <a:p>
             <a:fld id="{A2CD003A-446F-8148-BF9C-AE5CD7D09749}" type="datetime1">
               <a:rPr lang="nl-NL" smtClean="0"/>
-              <a:t>3-10-2021</a:t>
+              <a:t>09-10-2022</a:t>
             </a:fld>
             <a:endParaRPr lang="nl-NL"/>
           </a:p>
@@ -2941,7 +2940,7 @@
           <a:p>
             <a:fld id="{020E0409-E04F-4430-A784-C1A9179F1034}" type="slidenum">
               <a:rPr lang="nl-NL" smtClean="0"/>
-              <a:t>‹#›</a:t>
+              <a:t>‹nr.›</a:t>
             </a:fld>
             <a:endParaRPr lang="nl-NL"/>
           </a:p>
@@ -3152,7 +3151,7 @@
           <a:p>
             <a:fld id="{3DF0C36C-B394-1D48-9D1C-05A66426F65E}" type="datetime1">
               <a:rPr lang="nl-NL" smtClean="0"/>
-              <a:t>3-10-2021</a:t>
+              <a:t>09-10-2022</a:t>
             </a:fld>
             <a:endParaRPr lang="nl-NL"/>
           </a:p>
@@ -3194,7 +3193,7 @@
           <a:p>
             <a:fld id="{020E0409-E04F-4430-A784-C1A9179F1034}" type="slidenum">
               <a:rPr lang="nl-NL" smtClean="0"/>
-              <a:t>‹#›</a:t>
+              <a:t>‹nr.›</a:t>
             </a:fld>
             <a:endParaRPr lang="nl-NL"/>
           </a:p>
@@ -3365,7 +3364,7 @@
           <a:p>
             <a:fld id="{82EF86E6-8E6D-9F45-AD74-23EA88EE15FD}" type="datetime1">
               <a:rPr lang="nl-NL" smtClean="0"/>
-              <a:t>3-10-2021</a:t>
+              <a:t>09-10-2022</a:t>
             </a:fld>
             <a:endParaRPr lang="nl-NL"/>
           </a:p>
@@ -3443,7 +3442,7 @@
           <a:p>
             <a:fld id="{020E0409-E04F-4430-A784-C1A9179F1034}" type="slidenum">
               <a:rPr lang="nl-NL" smtClean="0"/>
-              <a:t>‹#›</a:t>
+              <a:t>‹nr.›</a:t>
             </a:fld>
             <a:endParaRPr lang="nl-NL"/>
           </a:p>
@@ -3765,21 +3764,21 @@
           <a:p>
             <a:r>
               <a:rPr lang="en-US" dirty="0"/>
-              <a:t>Survey Analysis</a:t>
+              <a:t>Survey Data Analysis</a:t>
             </a:r>
             <a:br>
               <a:rPr lang="en-US" dirty="0"/>
             </a:br>
             <a:r>
               <a:rPr lang="en-US" dirty="0"/>
-              <a:t>week 41</a:t>
+              <a:t>week 6</a:t>
             </a:r>
             <a:br>
               <a:rPr lang="en-US" dirty="0"/>
             </a:br>
             <a:r>
               <a:rPr lang="en-US" dirty="0"/>
-              <a:t>“R practical – putting it all together”</a:t>
+              <a:t>“R practical – Combinations of stratification and clustering”</a:t>
             </a:r>
             <a:endParaRPr lang="nl-NL" dirty="0"/>
           </a:p>
@@ -3795,7 +3794,12 @@
             <p:ph type="subTitle" idx="1"/>
           </p:nvPr>
         </p:nvSpPr>
-        <p:spPr/>
+        <p:spPr>
+          <a:xfrm>
+            <a:off x="1369368" y="4584561"/>
+            <a:ext cx="6400800" cy="1752600"/>
+          </a:xfrm>
+        </p:spPr>
         <p:txBody>
           <a:bodyPr/>
           <a:lstStyle/>
@@ -3865,369 +3869,444 @@
           <a:chExt cx="0" cy="0"/>
         </a:xfrm>
       </p:grpSpPr>
-      <p:sp>
-        <p:nvSpPr>
-          <p:cNvPr id="3" name="Tijdelijke aanduiding voor inhoud 2"/>
-          <p:cNvSpPr>
-            <a:spLocks noGrp="1"/>
-          </p:cNvSpPr>
-          <p:nvPr>
-            <p:ph idx="1"/>
-          </p:nvPr>
-        </p:nvSpPr>
-        <p:spPr/>
-        <p:txBody>
-          <a:bodyPr>
-            <a:normAutofit fontScale="77500" lnSpcReduction="20000"/>
-          </a:bodyPr>
-          <a:lstStyle/>
-          <a:p>
-            <a:r>
-              <a:rPr lang="nl-NL" dirty="0"/>
-              <a:t>We </a:t>
-            </a:r>
-            <a:r>
-              <a:rPr lang="nl-NL" dirty="0" err="1"/>
-              <a:t>discussed</a:t>
-            </a:r>
-            <a:r>
-              <a:rPr lang="nl-NL" dirty="0"/>
-              <a:t> SRS, </a:t>
-            </a:r>
-            <a:r>
-              <a:rPr lang="nl-NL" dirty="0" err="1"/>
-              <a:t>stratified</a:t>
-            </a:r>
-            <a:r>
-              <a:rPr lang="nl-NL" dirty="0"/>
-              <a:t> </a:t>
-            </a:r>
-            <a:r>
-              <a:rPr lang="nl-NL" dirty="0" err="1"/>
-              <a:t>and</a:t>
-            </a:r>
-            <a:r>
-              <a:rPr lang="nl-NL" dirty="0"/>
-              <a:t> cluster sampling</a:t>
-            </a:r>
-          </a:p>
-          <a:p>
-            <a:pPr lvl="1"/>
-            <a:r>
-              <a:rPr lang="nl-NL" dirty="0" err="1"/>
-              <a:t>With</a:t>
-            </a:r>
-            <a:r>
-              <a:rPr lang="nl-NL" dirty="0"/>
-              <a:t> </a:t>
-            </a:r>
-            <a:r>
-              <a:rPr lang="nl-NL" dirty="0" err="1"/>
-              <a:t>and</a:t>
-            </a:r>
-            <a:r>
-              <a:rPr lang="nl-NL" dirty="0"/>
-              <a:t> without </a:t>
-            </a:r>
-            <a:r>
-              <a:rPr lang="nl-NL" dirty="0" err="1"/>
-              <a:t>replacement</a:t>
-            </a:r>
-            <a:endParaRPr lang="nl-NL" dirty="0"/>
-          </a:p>
-          <a:p>
-            <a:pPr lvl="1"/>
-            <a:r>
-              <a:rPr lang="nl-NL" dirty="0" err="1"/>
-              <a:t>Equal</a:t>
-            </a:r>
-            <a:r>
-              <a:rPr lang="nl-NL" dirty="0"/>
-              <a:t> + </a:t>
-            </a:r>
-            <a:r>
-              <a:rPr lang="nl-NL" dirty="0" err="1"/>
-              <a:t>unequal</a:t>
-            </a:r>
-            <a:r>
-              <a:rPr lang="nl-NL" dirty="0"/>
-              <a:t> </a:t>
-            </a:r>
-            <a:r>
-              <a:rPr lang="nl-NL" dirty="0" err="1"/>
-              <a:t>probabilities</a:t>
-            </a:r>
-            <a:endParaRPr lang="nl-NL" dirty="0"/>
-          </a:p>
-          <a:p>
-            <a:pPr lvl="1"/>
-            <a:r>
-              <a:rPr lang="nl-NL" dirty="0" err="1"/>
-              <a:t>All</a:t>
-            </a:r>
-            <a:r>
-              <a:rPr lang="nl-NL" dirty="0"/>
-              <a:t> </a:t>
-            </a:r>
-            <a:r>
-              <a:rPr lang="nl-NL" dirty="0" err="1"/>
-              <a:t>with</a:t>
-            </a:r>
-            <a:r>
-              <a:rPr lang="nl-NL" dirty="0"/>
-              <a:t> </a:t>
-            </a:r>
-            <a:r>
-              <a:rPr lang="nl-NL" dirty="0" err="1"/>
-              <a:t>slighlty</a:t>
-            </a:r>
-            <a:r>
-              <a:rPr lang="nl-NL" dirty="0"/>
-              <a:t> different </a:t>
-            </a:r>
-            <a:r>
-              <a:rPr lang="nl-NL" dirty="0" err="1"/>
-              <a:t>formulas</a:t>
-            </a:r>
-            <a:endParaRPr lang="nl-NL" dirty="0"/>
-          </a:p>
-          <a:p>
-            <a:r>
-              <a:rPr lang="nl-NL" dirty="0" err="1"/>
-              <a:t>Horvitz</a:t>
-            </a:r>
-            <a:r>
-              <a:rPr lang="nl-NL" dirty="0"/>
-              <a:t> </a:t>
-            </a:r>
-            <a:r>
-              <a:rPr lang="nl-NL" dirty="0" err="1"/>
-              <a:t>and</a:t>
-            </a:r>
-            <a:r>
-              <a:rPr lang="nl-NL" dirty="0"/>
-              <a:t> Thompson (1952) </a:t>
-            </a:r>
-            <a:r>
-              <a:rPr lang="nl-NL" dirty="0" err="1"/>
-              <a:t>designed</a:t>
-            </a:r>
-            <a:r>
-              <a:rPr lang="nl-NL" dirty="0"/>
-              <a:t> a </a:t>
-            </a:r>
-            <a:r>
-              <a:rPr lang="nl-NL" dirty="0" err="1"/>
-              <a:t>general</a:t>
-            </a:r>
-            <a:r>
-              <a:rPr lang="nl-NL" dirty="0"/>
-              <a:t> </a:t>
-            </a:r>
-            <a:r>
-              <a:rPr lang="nl-NL" dirty="0" err="1"/>
-              <a:t>framework</a:t>
-            </a:r>
-            <a:r>
-              <a:rPr lang="nl-NL" dirty="0"/>
-              <a:t> </a:t>
-            </a:r>
-            <a:r>
-              <a:rPr lang="nl-NL" dirty="0" err="1"/>
-              <a:t>for</a:t>
-            </a:r>
-            <a:r>
-              <a:rPr lang="nl-NL" dirty="0"/>
-              <a:t> </a:t>
-            </a:r>
-            <a:r>
-              <a:rPr lang="nl-NL" dirty="0" err="1"/>
-              <a:t>inference</a:t>
-            </a:r>
-            <a:r>
-              <a:rPr lang="nl-NL" dirty="0"/>
-              <a:t> </a:t>
-            </a:r>
-            <a:r>
-              <a:rPr lang="nl-NL" dirty="0" err="1"/>
-              <a:t>for</a:t>
-            </a:r>
-            <a:r>
-              <a:rPr lang="nl-NL" dirty="0"/>
-              <a:t> random (</a:t>
-            </a:r>
-            <a:r>
-              <a:rPr lang="nl-NL" dirty="0" err="1"/>
-              <a:t>probability</a:t>
-            </a:r>
-            <a:r>
-              <a:rPr lang="nl-NL" dirty="0"/>
-              <a:t> </a:t>
-            </a:r>
-            <a:r>
-              <a:rPr lang="nl-NL" dirty="0" err="1"/>
-              <a:t>surveys</a:t>
-            </a:r>
-            <a:r>
-              <a:rPr lang="nl-NL" dirty="0"/>
-              <a:t>)</a:t>
-            </a:r>
-          </a:p>
-          <a:p>
-            <a:pPr lvl="1"/>
-            <a:endParaRPr lang="nl-NL" dirty="0"/>
-          </a:p>
-          <a:p>
-            <a:pPr lvl="1"/>
-            <a:r>
-              <a:rPr lang="nl-NL" dirty="0"/>
-              <a:t>For </a:t>
-            </a:r>
-            <a:r>
-              <a:rPr lang="nl-NL" dirty="0" err="1"/>
-              <a:t>mean</a:t>
-            </a:r>
-            <a:r>
-              <a:rPr lang="nl-NL" dirty="0"/>
-              <a:t>: </a:t>
-            </a:r>
-          </a:p>
-          <a:p>
-            <a:pPr lvl="1"/>
-            <a:endParaRPr lang="nl-NL" dirty="0"/>
-          </a:p>
-          <a:p>
-            <a:pPr lvl="2"/>
-            <a:endParaRPr lang="nl-NL" dirty="0"/>
-          </a:p>
-          <a:p>
-            <a:pPr lvl="2"/>
-            <a:r>
-              <a:rPr lang="nl-NL" dirty="0"/>
-              <a:t>𝛑</a:t>
-            </a:r>
-            <a:r>
-              <a:rPr lang="nl-NL" baseline="-25000" dirty="0"/>
-              <a:t>i </a:t>
-            </a:r>
-            <a:r>
-              <a:rPr lang="nl-NL" dirty="0"/>
-              <a:t>= </a:t>
-            </a:r>
-            <a:r>
-              <a:rPr lang="nl-NL" dirty="0" err="1"/>
-              <a:t>inclusion</a:t>
-            </a:r>
-            <a:r>
-              <a:rPr lang="nl-NL" dirty="0"/>
-              <a:t> </a:t>
-            </a:r>
-            <a:r>
-              <a:rPr lang="nl-NL" dirty="0" err="1"/>
-              <a:t>probability</a:t>
-            </a:r>
-            <a:r>
-              <a:rPr lang="nl-NL" dirty="0"/>
-              <a:t> of </a:t>
-            </a:r>
-            <a:r>
-              <a:rPr lang="nl-NL" dirty="0" err="1"/>
-              <a:t>individual</a:t>
-            </a:r>
-            <a:r>
-              <a:rPr lang="nl-NL" dirty="0"/>
-              <a:t> i, </a:t>
-            </a:r>
-          </a:p>
-          <a:p>
-            <a:pPr lvl="2"/>
-            <a:r>
-              <a:rPr lang="nl-NL" dirty="0"/>
-              <a:t>a</a:t>
-            </a:r>
-            <a:r>
-              <a:rPr lang="nl-NL" baseline="-25000" dirty="0"/>
-              <a:t>i</a:t>
-            </a:r>
-            <a:r>
-              <a:rPr lang="nl-NL" dirty="0"/>
-              <a:t>=1: in sample. a</a:t>
-            </a:r>
-            <a:r>
-              <a:rPr lang="nl-NL" baseline="-25000" dirty="0"/>
-              <a:t>i</a:t>
-            </a:r>
-            <a:r>
-              <a:rPr lang="nl-NL" dirty="0"/>
-              <a:t>=0, </a:t>
-            </a:r>
-            <a:r>
-              <a:rPr lang="nl-NL" dirty="0" err="1"/>
-              <a:t>not</a:t>
-            </a:r>
-            <a:r>
-              <a:rPr lang="nl-NL" dirty="0"/>
-              <a:t> </a:t>
-            </a:r>
-            <a:r>
-              <a:rPr lang="nl-NL" dirty="0" err="1"/>
-              <a:t>selected</a:t>
-            </a:r>
-            <a:endParaRPr lang="nl-NL" dirty="0"/>
-          </a:p>
-          <a:p>
-            <a:pPr lvl="2"/>
-            <a:r>
-              <a:rPr lang="nl-NL" dirty="0"/>
-              <a:t>S: </a:t>
-            </a:r>
-            <a:r>
-              <a:rPr lang="nl-NL" dirty="0" err="1"/>
-              <a:t>all</a:t>
-            </a:r>
-            <a:r>
-              <a:rPr lang="nl-NL" dirty="0"/>
-              <a:t> </a:t>
-            </a:r>
-            <a:r>
-              <a:rPr lang="nl-NL" dirty="0" err="1"/>
-              <a:t>individuals</a:t>
-            </a:r>
-            <a:r>
-              <a:rPr lang="nl-NL" dirty="0"/>
-              <a:t> in sample</a:t>
-            </a:r>
-          </a:p>
-          <a:p>
-            <a:pPr lvl="1"/>
-            <a:endParaRPr lang="nl-NL" dirty="0"/>
-          </a:p>
-        </p:txBody>
-      </p:sp>
-      <p:pic>
-        <p:nvPicPr>
-          <p:cNvPr id="4" name="Afbeelding 3"/>
-          <p:cNvPicPr>
-            <a:picLocks noChangeAspect="1"/>
-          </p:cNvPicPr>
-          <p:nvPr/>
-        </p:nvPicPr>
-        <p:blipFill>
-          <a:blip r:embed="rId2"/>
-          <a:stretch>
-            <a:fillRect/>
-          </a:stretch>
-        </p:blipFill>
-        <p:spPr>
-          <a:xfrm>
-            <a:off x="2116767" y="3992375"/>
-            <a:ext cx="1972000" cy="416891"/>
-          </a:xfrm>
-          <a:prstGeom prst="rect">
-            <a:avLst/>
-          </a:prstGeom>
-        </p:spPr>
-      </p:pic>
+      <mc:AlternateContent xmlns:mc="http://schemas.openxmlformats.org/markup-compatibility/2006">
+        <mc:Choice xmlns:a14="http://schemas.microsoft.com/office/drawing/2010/main" Requires="a14">
+          <p:sp>
+            <p:nvSpPr>
+              <p:cNvPr id="3" name="Tijdelijke aanduiding voor inhoud 2"/>
+              <p:cNvSpPr>
+                <a:spLocks noGrp="1"/>
+              </p:cNvSpPr>
+              <p:nvPr>
+                <p:ph idx="1"/>
+              </p:nvPr>
+            </p:nvSpPr>
+            <p:spPr/>
+            <p:txBody>
+              <a:bodyPr>
+                <a:normAutofit fontScale="92500" lnSpcReduction="10000"/>
+              </a:bodyPr>
+              <a:lstStyle/>
+              <a:p>
+                <a:r>
+                  <a:rPr lang="nl-NL" dirty="0"/>
+                  <a:t>We </a:t>
+                </a:r>
+                <a:r>
+                  <a:rPr lang="nl-NL" dirty="0" err="1"/>
+                  <a:t>discussed</a:t>
+                </a:r>
+                <a:r>
+                  <a:rPr lang="nl-NL" dirty="0"/>
+                  <a:t> SRS, </a:t>
+                </a:r>
+                <a:r>
+                  <a:rPr lang="nl-NL" dirty="0" err="1"/>
+                  <a:t>stratified</a:t>
+                </a:r>
+                <a:r>
+                  <a:rPr lang="nl-NL" dirty="0"/>
+                  <a:t> </a:t>
+                </a:r>
+                <a:r>
+                  <a:rPr lang="nl-NL" dirty="0" err="1"/>
+                  <a:t>and</a:t>
+                </a:r>
+                <a:r>
+                  <a:rPr lang="nl-NL" dirty="0"/>
+                  <a:t> cluster sampling</a:t>
+                </a:r>
+              </a:p>
+              <a:p>
+                <a:pPr lvl="1"/>
+                <a:r>
+                  <a:rPr lang="nl-NL" dirty="0" err="1"/>
+                  <a:t>With</a:t>
+                </a:r>
+                <a:r>
+                  <a:rPr lang="nl-NL" dirty="0"/>
+                  <a:t> </a:t>
+                </a:r>
+                <a:r>
+                  <a:rPr lang="nl-NL" dirty="0" err="1"/>
+                  <a:t>and</a:t>
+                </a:r>
+                <a:r>
+                  <a:rPr lang="nl-NL" dirty="0"/>
+                  <a:t> without </a:t>
+                </a:r>
+                <a:r>
+                  <a:rPr lang="nl-NL" dirty="0" err="1"/>
+                  <a:t>replacement</a:t>
+                </a:r>
+                <a:endParaRPr lang="nl-NL" dirty="0"/>
+              </a:p>
+              <a:p>
+                <a:pPr lvl="1"/>
+                <a:r>
+                  <a:rPr lang="nl-NL" dirty="0" err="1"/>
+                  <a:t>Equal</a:t>
+                </a:r>
+                <a:r>
+                  <a:rPr lang="nl-NL" dirty="0"/>
+                  <a:t> + </a:t>
+                </a:r>
+                <a:r>
+                  <a:rPr lang="nl-NL" dirty="0" err="1"/>
+                  <a:t>unequal</a:t>
+                </a:r>
+                <a:r>
+                  <a:rPr lang="nl-NL" dirty="0"/>
+                  <a:t> </a:t>
+                </a:r>
+                <a:r>
+                  <a:rPr lang="nl-NL" dirty="0" err="1"/>
+                  <a:t>probabilities</a:t>
+                </a:r>
+                <a:endParaRPr lang="nl-NL" dirty="0"/>
+              </a:p>
+              <a:p>
+                <a:pPr lvl="1"/>
+                <a:r>
+                  <a:rPr lang="nl-NL" dirty="0" err="1"/>
+                  <a:t>All</a:t>
+                </a:r>
+                <a:r>
+                  <a:rPr lang="nl-NL" dirty="0"/>
+                  <a:t> </a:t>
+                </a:r>
+                <a:r>
+                  <a:rPr lang="nl-NL" dirty="0" err="1"/>
+                  <a:t>with</a:t>
+                </a:r>
+                <a:r>
+                  <a:rPr lang="nl-NL" dirty="0"/>
+                  <a:t> </a:t>
+                </a:r>
+                <a:r>
+                  <a:rPr lang="nl-NL" dirty="0" err="1"/>
+                  <a:t>slighlty</a:t>
+                </a:r>
+                <a:r>
+                  <a:rPr lang="nl-NL" dirty="0"/>
+                  <a:t> different </a:t>
+                </a:r>
+                <a:r>
+                  <a:rPr lang="nl-NL" dirty="0" err="1"/>
+                  <a:t>formulas</a:t>
+                </a:r>
+                <a:endParaRPr lang="nl-NL" dirty="0"/>
+              </a:p>
+              <a:p>
+                <a:r>
+                  <a:rPr lang="nl-NL" dirty="0" err="1"/>
+                  <a:t>Horvitz</a:t>
+                </a:r>
+                <a:r>
+                  <a:rPr lang="nl-NL" dirty="0"/>
+                  <a:t> </a:t>
+                </a:r>
+                <a:r>
+                  <a:rPr lang="nl-NL" dirty="0" err="1"/>
+                  <a:t>and</a:t>
+                </a:r>
+                <a:r>
+                  <a:rPr lang="nl-NL" dirty="0"/>
+                  <a:t> Thompson (1952) </a:t>
+                </a:r>
+                <a:r>
+                  <a:rPr lang="nl-NL" dirty="0" err="1"/>
+                  <a:t>designed</a:t>
+                </a:r>
+                <a:r>
+                  <a:rPr lang="nl-NL" dirty="0"/>
+                  <a:t> a </a:t>
+                </a:r>
+                <a:r>
+                  <a:rPr lang="nl-NL" dirty="0" err="1"/>
+                  <a:t>general</a:t>
+                </a:r>
+                <a:r>
+                  <a:rPr lang="nl-NL" dirty="0"/>
+                  <a:t> </a:t>
+                </a:r>
+                <a:r>
+                  <a:rPr lang="nl-NL" dirty="0" err="1"/>
+                  <a:t>framework</a:t>
+                </a:r>
+                <a:r>
+                  <a:rPr lang="nl-NL" dirty="0"/>
+                  <a:t> </a:t>
+                </a:r>
+                <a:r>
+                  <a:rPr lang="nl-NL" dirty="0" err="1"/>
+                  <a:t>for</a:t>
+                </a:r>
+                <a:r>
+                  <a:rPr lang="nl-NL" dirty="0"/>
+                  <a:t> </a:t>
+                </a:r>
+                <a:r>
+                  <a:rPr lang="nl-NL" dirty="0" err="1"/>
+                  <a:t>inference</a:t>
+                </a:r>
+                <a:r>
+                  <a:rPr lang="nl-NL" dirty="0"/>
+                  <a:t> </a:t>
+                </a:r>
+                <a:r>
+                  <a:rPr lang="nl-NL" dirty="0" err="1"/>
+                  <a:t>for</a:t>
+                </a:r>
+                <a:r>
+                  <a:rPr lang="nl-NL" dirty="0"/>
+                  <a:t> random (</a:t>
+                </a:r>
+                <a:r>
+                  <a:rPr lang="nl-NL" dirty="0" err="1"/>
+                  <a:t>probability</a:t>
+                </a:r>
+                <a:r>
+                  <a:rPr lang="nl-NL" dirty="0"/>
+                  <a:t> </a:t>
+                </a:r>
+                <a:r>
+                  <a:rPr lang="nl-NL" dirty="0" err="1"/>
+                  <a:t>surveys</a:t>
+                </a:r>
+                <a:r>
+                  <a:rPr lang="nl-NL" dirty="0"/>
+                  <a:t>)</a:t>
+                </a:r>
+              </a:p>
+              <a:p>
+                <a:pPr lvl="1"/>
+                <a:endParaRPr lang="nl-NL" dirty="0"/>
+              </a:p>
+              <a:p>
+                <a:pPr lvl="1"/>
+                <a:r>
+                  <a:rPr lang="nl-NL" dirty="0"/>
+                  <a:t>For </a:t>
+                </a:r>
+                <a:r>
+                  <a:rPr lang="nl-NL" dirty="0" err="1"/>
+                  <a:t>mean</a:t>
+                </a:r>
+                <a:r>
+                  <a:rPr lang="nl-NL" dirty="0"/>
+                  <a:t>: </a:t>
+                </a:r>
+                <a14:m>
+                  <m:oMath xmlns:m="http://schemas.openxmlformats.org/officeDocument/2006/math">
+                    <m:sSub>
+                      <m:sSubPr>
+                        <m:ctrlPr>
+                          <a:rPr lang="nl-NL" i="1">
+                            <a:latin typeface="Cambria Math" panose="02040503050406030204" pitchFamily="18" charset="0"/>
+                          </a:rPr>
+                        </m:ctrlPr>
+                      </m:sSubPr>
+                      <m:e>
+                        <m:bar>
+                          <m:barPr>
+                            <m:pos m:val="top"/>
+                            <m:ctrlPr>
+                              <a:rPr lang="nl-NL" i="1">
+                                <a:latin typeface="Cambria Math" panose="02040503050406030204" pitchFamily="18" charset="0"/>
+                              </a:rPr>
+                            </m:ctrlPr>
+                          </m:barPr>
+                          <m:e>
+                            <m:r>
+                              <a:rPr lang="en-US" i="1">
+                                <a:latin typeface="Cambria Math" panose="02040503050406030204" pitchFamily="18" charset="0"/>
+                              </a:rPr>
+                              <m:t>𝑦</m:t>
+                            </m:r>
+                          </m:e>
+                        </m:bar>
+                      </m:e>
+                      <m:sub>
+                        <m:r>
+                          <a:rPr lang="en-US" i="1">
+                            <a:latin typeface="Cambria Math" panose="02040503050406030204" pitchFamily="18" charset="0"/>
+                          </a:rPr>
+                          <m:t>𝑤</m:t>
+                        </m:r>
+                      </m:sub>
+                    </m:sSub>
+                    <m:r>
+                      <a:rPr lang="en-US" i="1">
+                        <a:latin typeface="Cambria Math" panose="02040503050406030204" pitchFamily="18" charset="0"/>
+                      </a:rPr>
+                      <m:t>= </m:t>
+                    </m:r>
+                    <m:f>
+                      <m:fPr>
+                        <m:ctrlPr>
+                          <a:rPr lang="en-US" i="1">
+                            <a:latin typeface="Cambria Math" panose="02040503050406030204" pitchFamily="18" charset="0"/>
+                          </a:rPr>
+                        </m:ctrlPr>
+                      </m:fPr>
+                      <m:num>
+                        <m:nary>
+                          <m:naryPr>
+                            <m:chr m:val="∑"/>
+                            <m:subHide m:val="on"/>
+                            <m:supHide m:val="on"/>
+                            <m:ctrlPr>
+                              <a:rPr lang="en-US" i="1">
+                                <a:latin typeface="Cambria Math" panose="02040503050406030204" pitchFamily="18" charset="0"/>
+                              </a:rPr>
+                            </m:ctrlPr>
+                          </m:naryPr>
+                          <m:sub/>
+                          <m:sup/>
+                          <m:e>
+                            <m:sSub>
+                              <m:sSubPr>
+                                <m:ctrlPr>
+                                  <a:rPr lang="en-US" i="1">
+                                    <a:latin typeface="Cambria Math" panose="02040503050406030204" pitchFamily="18" charset="0"/>
+                                  </a:rPr>
+                                </m:ctrlPr>
+                              </m:sSubPr>
+                              <m:e>
+                                <m:r>
+                                  <a:rPr lang="en-US" i="1">
+                                    <a:latin typeface="Cambria Math" panose="02040503050406030204" pitchFamily="18" charset="0"/>
+                                  </a:rPr>
+                                  <m:t>𝑤</m:t>
+                                </m:r>
+                              </m:e>
+                              <m:sub>
+                                <m:r>
+                                  <a:rPr lang="en-US" i="1">
+                                    <a:latin typeface="Cambria Math" panose="02040503050406030204" pitchFamily="18" charset="0"/>
+                                  </a:rPr>
+                                  <m:t>𝑖</m:t>
+                                </m:r>
+                              </m:sub>
+                            </m:sSub>
+                            <m:sSub>
+                              <m:sSubPr>
+                                <m:ctrlPr>
+                                  <a:rPr lang="en-US" i="1">
+                                    <a:latin typeface="Cambria Math" panose="02040503050406030204" pitchFamily="18" charset="0"/>
+                                  </a:rPr>
+                                </m:ctrlPr>
+                              </m:sSubPr>
+                              <m:e>
+                                <m:r>
+                                  <a:rPr lang="en-US" i="1">
+                                    <a:latin typeface="Cambria Math" panose="02040503050406030204" pitchFamily="18" charset="0"/>
+                                  </a:rPr>
+                                  <m:t>𝑦</m:t>
+                                </m:r>
+                              </m:e>
+                              <m:sub>
+                                <m:r>
+                                  <a:rPr lang="en-US" i="1">
+                                    <a:latin typeface="Cambria Math" panose="02040503050406030204" pitchFamily="18" charset="0"/>
+                                  </a:rPr>
+                                  <m:t>𝑖</m:t>
+                                </m:r>
+                              </m:sub>
+                            </m:sSub>
+                          </m:e>
+                        </m:nary>
+                      </m:num>
+                      <m:den>
+                        <m:nary>
+                          <m:naryPr>
+                            <m:chr m:val="∑"/>
+                            <m:subHide m:val="on"/>
+                            <m:supHide m:val="on"/>
+                            <m:ctrlPr>
+                              <a:rPr lang="en-US" i="1">
+                                <a:latin typeface="Cambria Math" panose="02040503050406030204" pitchFamily="18" charset="0"/>
+                              </a:rPr>
+                            </m:ctrlPr>
+                          </m:naryPr>
+                          <m:sub/>
+                          <m:sup/>
+                          <m:e>
+                            <m:sSub>
+                              <m:sSubPr>
+                                <m:ctrlPr>
+                                  <a:rPr lang="en-US" i="1">
+                                    <a:latin typeface="Cambria Math" panose="02040503050406030204" pitchFamily="18" charset="0"/>
+                                  </a:rPr>
+                                </m:ctrlPr>
+                              </m:sSubPr>
+                              <m:e>
+                                <m:r>
+                                  <a:rPr lang="en-US" i="1">
+                                    <a:latin typeface="Cambria Math" panose="02040503050406030204" pitchFamily="18" charset="0"/>
+                                  </a:rPr>
+                                  <m:t>𝑤</m:t>
+                                </m:r>
+                              </m:e>
+                              <m:sub>
+                                <m:r>
+                                  <a:rPr lang="en-US" i="1">
+                                    <a:latin typeface="Cambria Math" panose="02040503050406030204" pitchFamily="18" charset="0"/>
+                                  </a:rPr>
+                                  <m:t>𝑖</m:t>
+                                </m:r>
+                              </m:sub>
+                            </m:sSub>
+                          </m:e>
+                        </m:nary>
+                      </m:den>
+                    </m:f>
+                  </m:oMath>
+                </a14:m>
+                <a:endParaRPr lang="nl-NL" dirty="0"/>
+              </a:p>
+              <a:p>
+                <a:pPr lvl="1"/>
+                <a:endParaRPr lang="nl-NL" dirty="0"/>
+              </a:p>
+            </p:txBody>
+          </p:sp>
+        </mc:Choice>
+        <mc:Fallback>
+          <p:sp>
+            <p:nvSpPr>
+              <p:cNvPr id="3" name="Tijdelijke aanduiding voor inhoud 2"/>
+              <p:cNvSpPr>
+                <a:spLocks noGrp="1" noRot="1" noChangeAspect="1" noMove="1" noResize="1" noEditPoints="1" noAdjustHandles="1" noChangeArrowheads="1" noChangeShapeType="1" noTextEdit="1"/>
+              </p:cNvSpPr>
+              <p:nvPr>
+                <p:ph idx="1"/>
+              </p:nvPr>
+            </p:nvSpPr>
+            <p:spPr>
+              <a:blipFill>
+                <a:blip r:embed="rId2"/>
+                <a:stretch>
+                  <a:fillRect l="-1698" t="-2521" r="-154" b="-10364"/>
+                </a:stretch>
+              </a:blipFill>
+            </p:spPr>
+            <p:txBody>
+              <a:bodyPr/>
+              <a:lstStyle/>
+              <a:p>
+                <a:r>
+                  <a:rPr lang="nl-NL">
+                    <a:noFill/>
+                  </a:rPr>
+                  <a:t> </a:t>
+                </a:r>
+              </a:p>
+            </p:txBody>
+          </p:sp>
+        </mc:Fallback>
+      </mc:AlternateContent>
       <p:sp>
         <p:nvSpPr>
           <p:cNvPr id="2" name="Titel 1"/>
@@ -4382,7 +4461,7 @@
         <p:spPr/>
         <p:txBody>
           <a:bodyPr>
-            <a:normAutofit fontScale="85000" lnSpcReduction="20000"/>
+            <a:normAutofit fontScale="92500" lnSpcReduction="10000"/>
           </a:bodyPr>
           <a:lstStyle/>
           <a:p>
@@ -4393,17 +4472,214 @@
               <a:buNone/>
               <a:defRPr/>
             </a:pPr>
+            <a:r>
+              <a:rPr lang="nl-NL" dirty="0"/>
+              <a:t>HT-</a:t>
+            </a:r>
+            <a:r>
+              <a:rPr lang="nl-NL" dirty="0" err="1"/>
+              <a:t>estimation</a:t>
+            </a:r>
+            <a:r>
+              <a:rPr lang="nl-NL" dirty="0"/>
+              <a:t> </a:t>
+            </a:r>
+            <a:r>
+              <a:rPr lang="nl-NL" dirty="0" err="1"/>
+              <a:t>works</a:t>
+            </a:r>
+            <a:r>
+              <a:rPr lang="nl-NL" dirty="0"/>
+              <a:t> </a:t>
+            </a:r>
+            <a:r>
+              <a:rPr lang="nl-NL" dirty="0" err="1"/>
+              <a:t>for</a:t>
+            </a:r>
+            <a:r>
+              <a:rPr lang="nl-NL" dirty="0"/>
+              <a:t> </a:t>
+            </a:r>
+            <a:r>
+              <a:rPr lang="nl-NL" dirty="0" err="1"/>
+              <a:t>all</a:t>
+            </a:r>
+            <a:r>
+              <a:rPr lang="nl-NL" dirty="0"/>
+              <a:t> design-</a:t>
+            </a:r>
+            <a:r>
+              <a:rPr lang="nl-NL" dirty="0" err="1"/>
+              <a:t>based</a:t>
+            </a:r>
+            <a:r>
+              <a:rPr lang="nl-NL" dirty="0"/>
+              <a:t> sampling </a:t>
+            </a:r>
+            <a:r>
+              <a:rPr lang="nl-NL" dirty="0" err="1"/>
+              <a:t>methods</a:t>
+            </a:r>
             <a:endParaRPr lang="nl-NL" dirty="0"/>
           </a:p>
           <a:p>
-            <a:pPr marL="0" indent="0" defTabSz="514350">
+            <a:pPr>
               <a:spcBef>
                 <a:spcPts val="0"/>
               </a:spcBef>
-              <a:buNone/>
-              <a:defRPr/>
             </a:pPr>
+            <a:r>
+              <a:rPr lang="nl-NL" dirty="0"/>
+              <a:t>SRS </a:t>
+            </a:r>
+            <a:r>
+              <a:rPr lang="nl-NL" dirty="0" err="1"/>
+              <a:t>equal</a:t>
+            </a:r>
+            <a:r>
+              <a:rPr lang="nl-NL" dirty="0"/>
+              <a:t> </a:t>
+            </a:r>
+            <a:r>
+              <a:rPr lang="nl-NL" dirty="0" err="1"/>
+              <a:t>probabilities</a:t>
+            </a:r>
+            <a:r>
+              <a:rPr lang="nl-NL" dirty="0"/>
+              <a:t>: 𝛑</a:t>
+            </a:r>
+            <a:r>
+              <a:rPr lang="nl-NL" baseline="-25000" dirty="0"/>
+              <a:t>i</a:t>
+            </a:r>
+            <a:r>
+              <a:rPr lang="nl-NL" dirty="0"/>
+              <a:t> = </a:t>
+            </a:r>
+            <a:r>
+              <a:rPr lang="nl-NL" dirty="0" err="1"/>
+              <a:t>equal</a:t>
+            </a:r>
             <a:endParaRPr lang="nl-NL" dirty="0"/>
+          </a:p>
+          <a:p>
+            <a:pPr>
+              <a:spcBef>
+                <a:spcPts val="0"/>
+              </a:spcBef>
+            </a:pPr>
+            <a:r>
+              <a:rPr lang="nl-NL" dirty="0" err="1"/>
+              <a:t>Stratified</a:t>
+            </a:r>
+            <a:r>
+              <a:rPr lang="nl-NL" dirty="0"/>
+              <a:t>: 𝛑</a:t>
+            </a:r>
+            <a:r>
+              <a:rPr lang="nl-NL" baseline="-25000" dirty="0"/>
+              <a:t>i</a:t>
+            </a:r>
+            <a:r>
+              <a:rPr lang="nl-NL" dirty="0"/>
+              <a:t> </a:t>
+            </a:r>
+            <a:r>
+              <a:rPr lang="nl-NL" dirty="0" err="1"/>
+              <a:t>depends</a:t>
+            </a:r>
+            <a:r>
+              <a:rPr lang="nl-NL" dirty="0"/>
+              <a:t> on </a:t>
+            </a:r>
+            <a:r>
+              <a:rPr lang="nl-NL" dirty="0" err="1"/>
+              <a:t>strata</a:t>
+            </a:r>
+            <a:r>
+              <a:rPr lang="nl-NL" dirty="0"/>
+              <a:t> </a:t>
+            </a:r>
+            <a:r>
+              <a:rPr lang="nl-NL" dirty="0" err="1"/>
+              <a:t>selection</a:t>
+            </a:r>
+            <a:endParaRPr lang="nl-NL" dirty="0"/>
+          </a:p>
+          <a:p>
+            <a:pPr>
+              <a:spcBef>
+                <a:spcPts val="0"/>
+              </a:spcBef>
+            </a:pPr>
+            <a:r>
+              <a:rPr lang="nl-NL" dirty="0" err="1"/>
+              <a:t>One</a:t>
+            </a:r>
+            <a:r>
+              <a:rPr lang="nl-NL" dirty="0"/>
+              <a:t>-stage cluster: 𝛑</a:t>
+            </a:r>
+            <a:r>
+              <a:rPr lang="nl-NL" baseline="-25000" dirty="0"/>
+              <a:t>i</a:t>
+            </a:r>
+            <a:r>
+              <a:rPr lang="nl-NL" dirty="0"/>
+              <a:t> </a:t>
+            </a:r>
+            <a:r>
+              <a:rPr lang="nl-NL" dirty="0" err="1"/>
+              <a:t>depends</a:t>
+            </a:r>
+            <a:r>
+              <a:rPr lang="nl-NL" dirty="0"/>
+              <a:t> on cluster </a:t>
+            </a:r>
+            <a:r>
+              <a:rPr lang="nl-NL" dirty="0" err="1"/>
+              <a:t>selection</a:t>
+            </a:r>
+            <a:endParaRPr lang="nl-NL" dirty="0"/>
+          </a:p>
+          <a:p>
+            <a:pPr>
+              <a:spcBef>
+                <a:spcPts val="0"/>
+              </a:spcBef>
+            </a:pPr>
+            <a:r>
+              <a:rPr lang="nl-NL" dirty="0" err="1"/>
+              <a:t>Two</a:t>
+            </a:r>
+            <a:r>
+              <a:rPr lang="nl-NL" dirty="0"/>
+              <a:t>-stage (</a:t>
+            </a:r>
+            <a:r>
+              <a:rPr lang="nl-NL" dirty="0" err="1"/>
+              <a:t>and</a:t>
+            </a:r>
+            <a:r>
+              <a:rPr lang="nl-NL" dirty="0"/>
+              <a:t> more complex): cluster </a:t>
+            </a:r>
+            <a:r>
+              <a:rPr lang="nl-NL" dirty="0" err="1"/>
+              <a:t>and</a:t>
+            </a:r>
+            <a:r>
+              <a:rPr lang="nl-NL" dirty="0"/>
+              <a:t> </a:t>
+            </a:r>
+            <a:r>
+              <a:rPr lang="nl-NL" dirty="0" err="1"/>
+              <a:t>within</a:t>
+            </a:r>
+            <a:r>
+              <a:rPr lang="nl-NL" dirty="0"/>
+              <a:t>-cluster</a:t>
+            </a:r>
           </a:p>
           <a:p>
             <a:pPr marL="0" indent="0">
@@ -4415,250 +4691,12 @@
             <a:endParaRPr lang="nl-NL" dirty="0"/>
           </a:p>
           <a:p>
-            <a:pPr marL="0" indent="0" defTabSz="514350">
-              <a:spcBef>
-                <a:spcPts val="0"/>
-              </a:spcBef>
-              <a:buNone/>
-              <a:defRPr/>
-            </a:pPr>
-            <a:r>
-              <a:rPr lang="nl-NL" dirty="0"/>
-              <a:t>HT-</a:t>
-            </a:r>
-            <a:r>
-              <a:rPr lang="nl-NL" dirty="0" err="1"/>
-              <a:t>estimation</a:t>
-            </a:r>
-            <a:r>
-              <a:rPr lang="nl-NL" dirty="0"/>
-              <a:t> </a:t>
-            </a:r>
-            <a:r>
-              <a:rPr lang="nl-NL" dirty="0" err="1"/>
-              <a:t>works</a:t>
-            </a:r>
-            <a:r>
-              <a:rPr lang="nl-NL" dirty="0"/>
-              <a:t> </a:t>
-            </a:r>
-            <a:r>
-              <a:rPr lang="nl-NL" dirty="0" err="1"/>
-              <a:t>for</a:t>
-            </a:r>
-            <a:r>
-              <a:rPr lang="nl-NL" dirty="0"/>
-              <a:t> </a:t>
-            </a:r>
-            <a:r>
-              <a:rPr lang="nl-NL" dirty="0" err="1"/>
-              <a:t>all</a:t>
-            </a:r>
-            <a:r>
-              <a:rPr lang="nl-NL" dirty="0"/>
-              <a:t> design-</a:t>
-            </a:r>
-            <a:r>
-              <a:rPr lang="nl-NL" dirty="0" err="1"/>
-              <a:t>based</a:t>
-            </a:r>
-            <a:r>
-              <a:rPr lang="nl-NL" dirty="0"/>
-              <a:t> sampling </a:t>
-            </a:r>
-            <a:r>
-              <a:rPr lang="nl-NL" dirty="0" err="1"/>
-              <a:t>methods</a:t>
-            </a:r>
-            <a:endParaRPr lang="nl-NL" dirty="0"/>
-          </a:p>
-          <a:p>
-            <a:pPr>
-              <a:spcBef>
-                <a:spcPts val="0"/>
-              </a:spcBef>
-            </a:pPr>
-            <a:r>
-              <a:rPr lang="nl-NL" dirty="0"/>
-              <a:t>	SRS </a:t>
-            </a:r>
-            <a:r>
-              <a:rPr lang="nl-NL" dirty="0" err="1"/>
-              <a:t>equal</a:t>
-            </a:r>
-            <a:r>
-              <a:rPr lang="nl-NL" dirty="0"/>
-              <a:t> </a:t>
-            </a:r>
-            <a:r>
-              <a:rPr lang="nl-NL" dirty="0" err="1"/>
-              <a:t>probabilities</a:t>
-            </a:r>
-            <a:r>
-              <a:rPr lang="nl-NL" dirty="0"/>
-              <a:t>: 𝛑</a:t>
-            </a:r>
-            <a:r>
-              <a:rPr lang="nl-NL" baseline="-25000" dirty="0"/>
-              <a:t>i</a:t>
-            </a:r>
-            <a:r>
-              <a:rPr lang="nl-NL" dirty="0"/>
-              <a:t> = </a:t>
-            </a:r>
-            <a:r>
-              <a:rPr lang="nl-NL" dirty="0" err="1"/>
-              <a:t>equal</a:t>
-            </a:r>
-            <a:endParaRPr lang="nl-NL" dirty="0"/>
-          </a:p>
-          <a:p>
-            <a:pPr>
-              <a:spcBef>
-                <a:spcPts val="0"/>
-              </a:spcBef>
-            </a:pPr>
-            <a:r>
-              <a:rPr lang="nl-NL" dirty="0"/>
-              <a:t>	</a:t>
-            </a:r>
-            <a:r>
-              <a:rPr lang="nl-NL" dirty="0" err="1"/>
-              <a:t>Stratified</a:t>
-            </a:r>
-            <a:r>
-              <a:rPr lang="nl-NL" dirty="0"/>
-              <a:t>: 𝛑</a:t>
-            </a:r>
-            <a:r>
-              <a:rPr lang="nl-NL" baseline="-25000" dirty="0"/>
-              <a:t>i</a:t>
-            </a:r>
-            <a:r>
-              <a:rPr lang="nl-NL" dirty="0"/>
-              <a:t> </a:t>
-            </a:r>
-            <a:r>
-              <a:rPr lang="nl-NL" dirty="0" err="1"/>
-              <a:t>depends</a:t>
-            </a:r>
-            <a:r>
-              <a:rPr lang="nl-NL" dirty="0"/>
-              <a:t> on </a:t>
-            </a:r>
-            <a:r>
-              <a:rPr lang="nl-NL" dirty="0" err="1"/>
-              <a:t>strata</a:t>
-            </a:r>
-            <a:r>
-              <a:rPr lang="nl-NL" dirty="0"/>
-              <a:t> </a:t>
-            </a:r>
-            <a:r>
-              <a:rPr lang="nl-NL" dirty="0" err="1"/>
-              <a:t>selection</a:t>
-            </a:r>
-            <a:endParaRPr lang="nl-NL" dirty="0"/>
-          </a:p>
-          <a:p>
-            <a:pPr>
-              <a:spcBef>
-                <a:spcPts val="0"/>
-              </a:spcBef>
-            </a:pPr>
-            <a:r>
-              <a:rPr lang="nl-NL" dirty="0"/>
-              <a:t>	</a:t>
-            </a:r>
-            <a:r>
-              <a:rPr lang="nl-NL" dirty="0" err="1"/>
-              <a:t>One</a:t>
-            </a:r>
-            <a:r>
-              <a:rPr lang="nl-NL" dirty="0"/>
-              <a:t>-stage cluster: 𝛑</a:t>
-            </a:r>
-            <a:r>
-              <a:rPr lang="nl-NL" baseline="-25000" dirty="0"/>
-              <a:t>i</a:t>
-            </a:r>
-            <a:r>
-              <a:rPr lang="nl-NL" dirty="0"/>
-              <a:t> </a:t>
-            </a:r>
-            <a:r>
-              <a:rPr lang="nl-NL" dirty="0" err="1"/>
-              <a:t>depends</a:t>
-            </a:r>
-            <a:r>
-              <a:rPr lang="nl-NL" dirty="0"/>
-              <a:t> on cluster </a:t>
-            </a:r>
-            <a:r>
-              <a:rPr lang="nl-NL" dirty="0" err="1"/>
-              <a:t>selection</a:t>
-            </a:r>
-            <a:endParaRPr lang="nl-NL" dirty="0"/>
-          </a:p>
-          <a:p>
-            <a:pPr>
-              <a:spcBef>
-                <a:spcPts val="0"/>
-              </a:spcBef>
-            </a:pPr>
-            <a:r>
-              <a:rPr lang="nl-NL" dirty="0"/>
-              <a:t>	</a:t>
-            </a:r>
-            <a:r>
-              <a:rPr lang="nl-NL" dirty="0" err="1"/>
-              <a:t>Two</a:t>
-            </a:r>
-            <a:r>
-              <a:rPr lang="nl-NL" dirty="0"/>
-              <a:t>-stage (</a:t>
-            </a:r>
-            <a:r>
-              <a:rPr lang="nl-NL" dirty="0" err="1"/>
-              <a:t>and</a:t>
-            </a:r>
-            <a:r>
-              <a:rPr lang="nl-NL" dirty="0"/>
-              <a:t> more complex): cluster </a:t>
-            </a:r>
-            <a:r>
-              <a:rPr lang="nl-NL" dirty="0" err="1"/>
-              <a:t>and</a:t>
-            </a:r>
-            <a:r>
-              <a:rPr lang="nl-NL" dirty="0"/>
-              <a:t> </a:t>
-            </a:r>
-            <a:r>
-              <a:rPr lang="nl-NL" dirty="0" err="1"/>
-              <a:t>within</a:t>
-            </a:r>
-            <a:r>
-              <a:rPr lang="nl-NL" dirty="0"/>
-              <a:t>-cluster</a:t>
-            </a:r>
-          </a:p>
-          <a:p>
             <a:pPr marL="0" indent="0">
               <a:spcBef>
                 <a:spcPts val="0"/>
               </a:spcBef>
               <a:buNone/>
             </a:pPr>
-            <a:endParaRPr lang="nl-NL" dirty="0"/>
-          </a:p>
-          <a:p>
-            <a:pPr marL="0" indent="0">
-              <a:spcBef>
-                <a:spcPts val="0"/>
-              </a:spcBef>
-              <a:buNone/>
-            </a:pPr>
             <a:r>
               <a:rPr lang="nl-NL" dirty="0" err="1">
                 <a:solidFill>
@@ -4790,30 +4828,6 @@
           </a:p>
         </p:txBody>
       </p:sp>
-      <p:pic>
-        <p:nvPicPr>
-          <p:cNvPr id="4" name="Afbeelding 3"/>
-          <p:cNvPicPr>
-            <a:picLocks noChangeAspect="1"/>
-          </p:cNvPicPr>
-          <p:nvPr/>
-        </p:nvPicPr>
-        <p:blipFill>
-          <a:blip r:embed="rId2"/>
-          <a:stretch>
-            <a:fillRect/>
-          </a:stretch>
-        </p:blipFill>
-        <p:spPr>
-          <a:xfrm>
-            <a:off x="565465" y="2226469"/>
-            <a:ext cx="3820913" cy="807760"/>
-          </a:xfrm>
-          <a:prstGeom prst="rect">
-            <a:avLst/>
-          </a:prstGeom>
-        </p:spPr>
-      </p:pic>
       <p:sp>
         <p:nvSpPr>
           <p:cNvPr id="5" name="Tijdelijke aanduiding voor dianummer 4"/>
@@ -4869,187 +4883,6 @@
       </p:grpSpPr>
       <p:sp>
         <p:nvSpPr>
-          <p:cNvPr id="2" name="Titel 1"/>
-          <p:cNvSpPr>
-            <a:spLocks noGrp="1"/>
-          </p:cNvSpPr>
-          <p:nvPr>
-            <p:ph type="title"/>
-          </p:nvPr>
-        </p:nvSpPr>
-        <p:spPr/>
-        <p:txBody>
-          <a:bodyPr/>
-          <a:lstStyle/>
-          <a:p>
-            <a:r>
-              <a:rPr lang="nl-NL" dirty="0" err="1"/>
-              <a:t>Horvitz</a:t>
-            </a:r>
-            <a:r>
-              <a:rPr lang="nl-NL" dirty="0"/>
-              <a:t> Thompson: </a:t>
-            </a:r>
-            <a:r>
-              <a:rPr lang="nl-NL" dirty="0" err="1"/>
-              <a:t>stratified</a:t>
-            </a:r>
-            <a:endParaRPr lang="nl-NL" dirty="0"/>
-          </a:p>
-        </p:txBody>
-      </p:sp>
-      <p:sp>
-        <p:nvSpPr>
-          <p:cNvPr id="3" name="Tijdelijke aanduiding voor inhoud 2"/>
-          <p:cNvSpPr>
-            <a:spLocks noGrp="1"/>
-          </p:cNvSpPr>
-          <p:nvPr>
-            <p:ph idx="1"/>
-          </p:nvPr>
-        </p:nvSpPr>
-        <p:spPr/>
-        <p:txBody>
-          <a:bodyPr/>
-          <a:lstStyle/>
-          <a:p>
-            <a:r>
-              <a:rPr lang="nl-NL" dirty="0"/>
-              <a:t>Sample n1 out of N1, n2 out of N2</a:t>
-            </a:r>
-          </a:p>
-          <a:p>
-            <a:endParaRPr lang="nl-NL" dirty="0"/>
-          </a:p>
-          <a:p>
-            <a:endParaRPr lang="nl-NL" dirty="0"/>
-          </a:p>
-          <a:p>
-            <a:endParaRPr lang="nl-NL" dirty="0"/>
-          </a:p>
-          <a:p>
-            <a:endParaRPr lang="nl-NL" dirty="0"/>
-          </a:p>
-          <a:p>
-            <a:endParaRPr lang="nl-NL" dirty="0"/>
-          </a:p>
-          <a:p>
-            <a:endParaRPr lang="nl-NL" dirty="0"/>
-          </a:p>
-          <a:p>
-            <a:endParaRPr lang="nl-NL" dirty="0"/>
-          </a:p>
-          <a:p>
-            <a:endParaRPr lang="nl-NL" dirty="0"/>
-          </a:p>
-          <a:p>
-            <a:endParaRPr lang="nl-NL" dirty="0"/>
-          </a:p>
-        </p:txBody>
-      </p:sp>
-      <p:pic>
-        <p:nvPicPr>
-          <p:cNvPr id="5" name="Afbeelding 4"/>
-          <p:cNvPicPr>
-            <a:picLocks noChangeAspect="1"/>
-          </p:cNvPicPr>
-          <p:nvPr/>
-        </p:nvPicPr>
-        <p:blipFill>
-          <a:blip r:embed="rId2"/>
-          <a:stretch>
-            <a:fillRect/>
-          </a:stretch>
-        </p:blipFill>
-        <p:spPr>
-          <a:xfrm>
-            <a:off x="945939" y="2584011"/>
-            <a:ext cx="4480988" cy="1065703"/>
-          </a:xfrm>
-          <a:prstGeom prst="rect">
-            <a:avLst/>
-          </a:prstGeom>
-        </p:spPr>
-      </p:pic>
-      <p:pic>
-        <p:nvPicPr>
-          <p:cNvPr id="6" name="Afbeelding 5"/>
-          <p:cNvPicPr>
-            <a:picLocks noChangeAspect="1"/>
-          </p:cNvPicPr>
-          <p:nvPr/>
-        </p:nvPicPr>
-        <p:blipFill>
-          <a:blip r:embed="rId3"/>
-          <a:stretch>
-            <a:fillRect/>
-          </a:stretch>
-        </p:blipFill>
-        <p:spPr>
-          <a:xfrm>
-            <a:off x="969274" y="3750917"/>
-            <a:ext cx="3602726" cy="816067"/>
-          </a:xfrm>
-          <a:prstGeom prst="rect">
-            <a:avLst/>
-          </a:prstGeom>
-        </p:spPr>
-      </p:pic>
-      <p:sp>
-        <p:nvSpPr>
-          <p:cNvPr id="4" name="Tijdelijke aanduiding voor dianummer 3"/>
-          <p:cNvSpPr>
-            <a:spLocks noGrp="1"/>
-          </p:cNvSpPr>
-          <p:nvPr>
-            <p:ph type="sldNum" sz="quarter" idx="12"/>
-          </p:nvPr>
-        </p:nvSpPr>
-        <p:spPr/>
-        <p:txBody>
-          <a:bodyPr/>
-          <a:lstStyle/>
-          <a:p>
-            <a:fld id="{020E0409-E04F-4430-A784-C1A9179F1034}" type="slidenum">
-              <a:rPr lang="nl-NL" smtClean="0"/>
-              <a:t>12</a:t>
-            </a:fld>
-            <a:endParaRPr lang="nl-NL"/>
-          </a:p>
-        </p:txBody>
-      </p:sp>
-    </p:spTree>
-    <p:extLst>
-      <p:ext uri="{BB962C8B-B14F-4D97-AF65-F5344CB8AC3E}">
-        <p14:creationId xmlns:p14="http://schemas.microsoft.com/office/powerpoint/2010/main" val="941287940"/>
-      </p:ext>
-    </p:extLst>
-  </p:cSld>
-  <p:clrMapOvr>
-    <a:masterClrMapping/>
-  </p:clrMapOvr>
-</p:sld>
-</file>
-
-<file path=ppt/slides/slide13.xml><?xml version="1.0" encoding="utf-8"?>
-<p:sld xmlns:a="http://schemas.openxmlformats.org/drawingml/2006/main" xmlns:r="http://schemas.openxmlformats.org/officeDocument/2006/relationships" xmlns:p="http://schemas.openxmlformats.org/presentationml/2006/main">
-  <p:cSld>
-    <p:spTree>
-      <p:nvGrpSpPr>
-        <p:cNvPr id="1" name=""/>
-        <p:cNvGrpSpPr/>
-        <p:nvPr/>
-      </p:nvGrpSpPr>
-      <p:grpSpPr>
-        <a:xfrm>
-          <a:off x="0" y="0"/>
-          <a:ext cx="0" cy="0"/>
-          <a:chOff x="0" y="0"/>
-          <a:chExt cx="0" cy="0"/>
-        </a:xfrm>
-      </p:grpSpPr>
-      <p:sp>
-        <p:nvSpPr>
           <p:cNvPr id="2" name="Title 1"/>
           <p:cNvSpPr>
             <a:spLocks noGrp="1"/>
@@ -5193,7 +5026,7 @@
 </p:sld>
 </file>
 
-<file path=ppt/slides/slide14.xml><?xml version="1.0" encoding="utf-8"?>
+<file path=ppt/slides/slide13.xml><?xml version="1.0" encoding="utf-8"?>
 <p:sld xmlns:a="http://schemas.openxmlformats.org/drawingml/2006/main" xmlns:r="http://schemas.openxmlformats.org/officeDocument/2006/relationships" xmlns:p="http://schemas.openxmlformats.org/presentationml/2006/main">
   <p:cSld>
     <p:spTree>
@@ -5312,14 +5145,14 @@
           </a:ln>
           <a:extLst>
             <a:ext uri="{909E8E84-426E-40dd-AFC4-6F175D3DCCD1}">
-              <a14:hiddenFill xmlns="" xmlns:a14="http://schemas.microsoft.com/office/drawing/2010/main">
+              <a14:hiddenFill xmlns:a14="http://schemas.microsoft.com/office/drawing/2010/main" xmlns="">
                 <a:solidFill>
                   <a:schemeClr val="accent1"/>
                 </a:solidFill>
               </a14:hiddenFill>
             </a:ext>
             <a:ext uri="{91240B29-F687-4f45-9708-019B960494DF}">
-              <a14:hiddenLine xmlns="" xmlns:a14="http://schemas.microsoft.com/office/drawing/2010/main" w="9525">
+              <a14:hiddenLine xmlns:a14="http://schemas.microsoft.com/office/drawing/2010/main" xmlns="" w="9525">
                 <a:solidFill>
                   <a:schemeClr val="tx1"/>
                 </a:solidFill>
@@ -5501,7 +5334,7 @@
 </p:sld>
 </file>
 
-<file path=ppt/slides/slide15.xml><?xml version="1.0" encoding="utf-8"?>
+<file path=ppt/slides/slide14.xml><?xml version="1.0" encoding="utf-8"?>
 <p:sld xmlns:a="http://schemas.openxmlformats.org/drawingml/2006/main" xmlns:r="http://schemas.openxmlformats.org/officeDocument/2006/relationships" xmlns:p="http://schemas.openxmlformats.org/presentationml/2006/main">
   <p:cSld>
     <p:spTree>
@@ -5553,14 +5386,14 @@
           </a:ln>
           <a:extLst>
             <a:ext uri="{909E8E84-426E-40dd-AFC4-6F175D3DCCD1}">
-              <a14:hiddenFill xmlns="" xmlns:a14="http://schemas.microsoft.com/office/drawing/2010/main">
+              <a14:hiddenFill xmlns:a14="http://schemas.microsoft.com/office/drawing/2010/main" xmlns="">
                 <a:solidFill>
                   <a:schemeClr val="accent1"/>
                 </a:solidFill>
               </a14:hiddenFill>
             </a:ext>
             <a:ext uri="{91240B29-F687-4f45-9708-019B960494DF}">
-              <a14:hiddenLine xmlns="" xmlns:a14="http://schemas.microsoft.com/office/drawing/2010/main" w="9525">
+              <a14:hiddenLine xmlns:a14="http://schemas.microsoft.com/office/drawing/2010/main" xmlns="" w="9525">
                 <a:solidFill>
                   <a:schemeClr val="tx1"/>
                 </a:solidFill>
@@ -5695,7 +5528,7 @@
 </p:sld>
 </file>
 
-<file path=ppt/slides/slide16.xml><?xml version="1.0" encoding="utf-8"?>
+<file path=ppt/slides/slide15.xml><?xml version="1.0" encoding="utf-8"?>
 <p:sld xmlns:a="http://schemas.openxmlformats.org/drawingml/2006/main" xmlns:r="http://schemas.openxmlformats.org/officeDocument/2006/relationships" xmlns:p="http://schemas.openxmlformats.org/presentationml/2006/main">
   <p:cSld>
     <p:spTree>
@@ -5747,14 +5580,14 @@
           </a:ln>
           <a:extLst>
             <a:ext uri="{909E8E84-426E-40dd-AFC4-6F175D3DCCD1}">
-              <a14:hiddenFill xmlns="" xmlns:a14="http://schemas.microsoft.com/office/drawing/2010/main">
+              <a14:hiddenFill xmlns:a14="http://schemas.microsoft.com/office/drawing/2010/main" xmlns="">
                 <a:solidFill>
                   <a:schemeClr val="accent1"/>
                 </a:solidFill>
               </a14:hiddenFill>
             </a:ext>
             <a:ext uri="{91240B29-F687-4f45-9708-019B960494DF}">
-              <a14:hiddenLine xmlns="" xmlns:a14="http://schemas.microsoft.com/office/drawing/2010/main" w="9525">
+              <a14:hiddenLine xmlns:a14="http://schemas.microsoft.com/office/drawing/2010/main" xmlns="" w="9525">
                 <a:solidFill>
                   <a:schemeClr val="tx1"/>
                 </a:solidFill>
@@ -5967,6 +5800,364 @@
     <p:extLst>
       <p:ext uri="{BB962C8B-B14F-4D97-AF65-F5344CB8AC3E}">
         <p14:creationId xmlns:p14="http://schemas.microsoft.com/office/powerpoint/2010/main" val="793161726"/>
+      </p:ext>
+    </p:extLst>
+  </p:cSld>
+  <p:clrMapOvr>
+    <a:masterClrMapping/>
+  </p:clrMapOvr>
+  <p:timing>
+    <p:tnLst>
+      <p:par>
+        <p:cTn id="1" dur="indefinite" restart="never" nodeType="tmRoot">
+          <p:childTnLst>
+            <p:seq concurrent="1" nextAc="seek">
+              <p:cTn id="2" dur="indefinite" nodeType="mainSeq">
+                <p:childTnLst>
+                  <p:par>
+                    <p:cTn id="3" fill="hold">
+                      <p:stCondLst>
+                        <p:cond delay="indefinite"/>
+                      </p:stCondLst>
+                      <p:childTnLst>
+                        <p:par>
+                          <p:cTn id="4" fill="hold">
+                            <p:stCondLst>
+                              <p:cond delay="0"/>
+                            </p:stCondLst>
+                            <p:childTnLst>
+                              <p:par>
+                                <p:cTn id="5" presetID="1" presetClass="entr" presetSubtype="0" fill="hold" nodeType="clickEffect">
+                                  <p:stCondLst>
+                                    <p:cond delay="0"/>
+                                  </p:stCondLst>
+                                  <p:childTnLst>
+                                    <p:set>
+                                      <p:cBhvr>
+                                        <p:cTn id="6" dur="1" fill="hold">
+                                          <p:stCondLst>
+                                            <p:cond delay="0"/>
+                                          </p:stCondLst>
+                                        </p:cTn>
+                                        <p:tgtEl>
+                                          <p:spTgt spid="5"/>
+                                        </p:tgtEl>
+                                        <p:attrNameLst>
+                                          <p:attrName>style.visibility</p:attrName>
+                                        </p:attrNameLst>
+                                      </p:cBhvr>
+                                      <p:to>
+                                        <p:strVal val="visible"/>
+                                      </p:to>
+                                    </p:set>
+                                  </p:childTnLst>
+                                </p:cTn>
+                              </p:par>
+                            </p:childTnLst>
+                          </p:cTn>
+                        </p:par>
+                      </p:childTnLst>
+                    </p:cTn>
+                  </p:par>
+                </p:childTnLst>
+              </p:cTn>
+              <p:prevCondLst>
+                <p:cond evt="onPrev" delay="0">
+                  <p:tgtEl>
+                    <p:sldTgt/>
+                  </p:tgtEl>
+                </p:cond>
+              </p:prevCondLst>
+              <p:nextCondLst>
+                <p:cond evt="onNext" delay="0">
+                  <p:tgtEl>
+                    <p:sldTgt/>
+                  </p:tgtEl>
+                </p:cond>
+              </p:nextCondLst>
+            </p:seq>
+          </p:childTnLst>
+        </p:cTn>
+      </p:par>
+    </p:tnLst>
+  </p:timing>
+</p:sld>
+</file>
+
+<file path=ppt/slides/slide16.xml><?xml version="1.0" encoding="utf-8"?>
+<p:sld xmlns:a="http://schemas.openxmlformats.org/drawingml/2006/main" xmlns:r="http://schemas.openxmlformats.org/officeDocument/2006/relationships" xmlns:p="http://schemas.openxmlformats.org/presentationml/2006/main">
+  <p:cSld>
+    <p:spTree>
+      <p:nvGrpSpPr>
+        <p:cNvPr id="1" name=""/>
+        <p:cNvGrpSpPr/>
+        <p:nvPr/>
+      </p:nvGrpSpPr>
+      <p:grpSpPr>
+        <a:xfrm>
+          <a:off x="0" y="0"/>
+          <a:ext cx="0" cy="0"/>
+          <a:chOff x="0" y="0"/>
+          <a:chExt cx="0" cy="0"/>
+        </a:xfrm>
+      </p:grpSpPr>
+      <p:pic>
+        <p:nvPicPr>
+          <p:cNvPr id="8" name="Picture 7"/>
+          <p:cNvPicPr>
+            <a:picLocks noChangeAspect="1" noChangeArrowheads="1"/>
+          </p:cNvPicPr>
+          <p:nvPr/>
+        </p:nvPicPr>
+        <p:blipFill>
+          <a:blip r:embed="rId2">
+            <a:extLst>
+              <a:ext uri="{28A0092B-C50C-407E-A947-70E740481C1C}">
+                <a14:useLocalDpi xmlns:a14="http://schemas.microsoft.com/office/drawing/2010/main" val="0"/>
+              </a:ext>
+            </a:extLst>
+          </a:blip>
+          <a:srcRect/>
+          <a:stretch>
+            <a:fillRect/>
+          </a:stretch>
+        </p:blipFill>
+        <p:spPr bwMode="auto">
+          <a:xfrm>
+            <a:off x="0" y="1784082"/>
+            <a:ext cx="4906736" cy="4089943"/>
+          </a:xfrm>
+          <a:prstGeom prst="rect">
+            <a:avLst/>
+          </a:prstGeom>
+          <a:noFill/>
+          <a:ln>
+            <a:noFill/>
+          </a:ln>
+          <a:extLst>
+            <a:ext uri="{909E8E84-426E-40dd-AFC4-6F175D3DCCD1}">
+              <a14:hiddenFill xmlns:a14="http://schemas.microsoft.com/office/drawing/2010/main" xmlns="">
+                <a:solidFill>
+                  <a:schemeClr val="accent1"/>
+                </a:solidFill>
+              </a14:hiddenFill>
+            </a:ext>
+            <a:ext uri="{91240B29-F687-4f45-9708-019B960494DF}">
+              <a14:hiddenLine xmlns:a14="http://schemas.microsoft.com/office/drawing/2010/main" xmlns="" w="9525">
+                <a:solidFill>
+                  <a:schemeClr val="tx1"/>
+                </a:solidFill>
+                <a:miter lim="800000"/>
+                <a:headEnd/>
+                <a:tailEnd/>
+              </a14:hiddenLine>
+            </a:ext>
+          </a:extLst>
+        </p:spPr>
+      </p:pic>
+      <p:sp>
+        <p:nvSpPr>
+          <p:cNvPr id="2" name="Title 1"/>
+          <p:cNvSpPr>
+            <a:spLocks noGrp="1"/>
+          </p:cNvSpPr>
+          <p:nvPr>
+            <p:ph type="title"/>
+          </p:nvPr>
+        </p:nvSpPr>
+        <p:spPr/>
+        <p:txBody>
+          <a:bodyPr/>
+          <a:lstStyle/>
+          <a:p>
+            <a:r>
+              <a:rPr lang="en-US" dirty="0"/>
+              <a:t>Variance estimation using weights</a:t>
+            </a:r>
+            <a:endParaRPr lang="nl-NL" dirty="0"/>
+          </a:p>
+        </p:txBody>
+      </p:sp>
+      <p:sp>
+        <p:nvSpPr>
+          <p:cNvPr id="4" name="TextBox 3"/>
+          <p:cNvSpPr txBox="1"/>
+          <p:nvPr/>
+        </p:nvSpPr>
+        <p:spPr>
+          <a:xfrm>
+            <a:off x="3812720" y="3415222"/>
+            <a:ext cx="4490358" cy="923330"/>
+          </a:xfrm>
+          <a:prstGeom prst="rect">
+            <a:avLst/>
+          </a:prstGeom>
+          <a:solidFill>
+            <a:schemeClr val="bg1"/>
+          </a:solidFill>
+        </p:spPr>
+        <p:txBody>
+          <a:bodyPr wrap="square" rtlCol="0">
+            <a:spAutoFit/>
+          </a:bodyPr>
+          <a:lstStyle/>
+          <a:p>
+            <a:pPr marL="214313" indent="-214313">
+              <a:buFontTx/>
+              <a:buChar char="-"/>
+            </a:pPr>
+            <a:r>
+              <a:rPr lang="en-US" sz="1350" dirty="0"/>
+              <a:t>Stage 1: clusters out of strata</a:t>
+            </a:r>
+          </a:p>
+          <a:p>
+            <a:pPr marL="557213" lvl="1" indent="-214313">
+              <a:buFontTx/>
+              <a:buChar char="-"/>
+            </a:pPr>
+            <a:r>
+              <a:rPr lang="en-US" sz="1350" dirty="0" err="1"/>
+              <a:t>Wt|s,master</a:t>
+            </a:r>
+            <a:r>
+              <a:rPr lang="en-US" sz="1350" dirty="0"/>
+              <a:t> = 8 out of 150 -&gt; 18.75</a:t>
+            </a:r>
+          </a:p>
+          <a:p>
+            <a:pPr marL="557213" lvl="1" indent="-214313">
+              <a:buFontTx/>
+              <a:buChar char="-"/>
+            </a:pPr>
+            <a:r>
+              <a:rPr lang="en-US" sz="1350" dirty="0" err="1"/>
+              <a:t>Wt|s,Bachelor</a:t>
+            </a:r>
+            <a:r>
+              <a:rPr lang="en-US" sz="1350" dirty="0"/>
+              <a:t> = 8 out of 50 -&gt; 6,25</a:t>
+            </a:r>
+          </a:p>
+          <a:p>
+            <a:pPr lvl="1"/>
+            <a:endParaRPr lang="en-US" sz="1350" dirty="0"/>
+          </a:p>
+        </p:txBody>
+      </p:sp>
+      <p:cxnSp>
+        <p:nvCxnSpPr>
+          <p:cNvPr id="5" name="Straight Arrow Connector 4"/>
+          <p:cNvCxnSpPr/>
+          <p:nvPr/>
+        </p:nvCxnSpPr>
+        <p:spPr>
+          <a:xfrm flipV="1">
+            <a:off x="6662057" y="2645228"/>
+            <a:ext cx="8165" cy="449532"/>
+          </a:xfrm>
+          <a:prstGeom prst="straightConnector1">
+            <a:avLst/>
+          </a:prstGeom>
+          <a:ln>
+            <a:tailEnd type="arrow"/>
+          </a:ln>
+        </p:spPr>
+        <p:style>
+          <a:lnRef idx="1">
+            <a:schemeClr val="accent1"/>
+          </a:lnRef>
+          <a:fillRef idx="0">
+            <a:schemeClr val="accent1"/>
+          </a:fillRef>
+          <a:effectRef idx="0">
+            <a:schemeClr val="accent1"/>
+          </a:effectRef>
+          <a:fontRef idx="minor">
+            <a:schemeClr val="tx1"/>
+          </a:fontRef>
+        </p:style>
+      </p:cxnSp>
+      <p:sp>
+        <p:nvSpPr>
+          <p:cNvPr id="7" name="TextBox 6"/>
+          <p:cNvSpPr txBox="1"/>
+          <p:nvPr/>
+        </p:nvSpPr>
+        <p:spPr>
+          <a:xfrm>
+            <a:off x="3812720" y="2164378"/>
+            <a:ext cx="4490358" cy="1131079"/>
+          </a:xfrm>
+          <a:prstGeom prst="rect">
+            <a:avLst/>
+          </a:prstGeom>
+          <a:solidFill>
+            <a:schemeClr val="bg1"/>
+          </a:solidFill>
+        </p:spPr>
+        <p:txBody>
+          <a:bodyPr wrap="square" rtlCol="0">
+            <a:spAutoFit/>
+          </a:bodyPr>
+          <a:lstStyle/>
+          <a:p>
+            <a:r>
+              <a:rPr lang="en-US" sz="1350" dirty="0"/>
+              <a:t>- Weights:</a:t>
+            </a:r>
+          </a:p>
+          <a:p>
+            <a:pPr marL="214313" indent="-214313">
+              <a:buFontTx/>
+              <a:buChar char="-"/>
+            </a:pPr>
+            <a:r>
+              <a:rPr lang="en-US" sz="1350" dirty="0"/>
+              <a:t>Stage 2: per cluster: </a:t>
+            </a:r>
+          </a:p>
+          <a:p>
+            <a:pPr marL="557213" lvl="1" indent="-214313">
+              <a:buFontTx/>
+              <a:buChar char="-"/>
+            </a:pPr>
+            <a:r>
+              <a:rPr lang="en-US" sz="1350" dirty="0" err="1"/>
+              <a:t>Wt|s,master</a:t>
+            </a:r>
+            <a:r>
+              <a:rPr lang="en-US" sz="1350" dirty="0"/>
+              <a:t> = 15 out of 40 -&gt; 2.5</a:t>
+            </a:r>
+          </a:p>
+          <a:p>
+            <a:pPr marL="557213" lvl="1" indent="-214313">
+              <a:buFontTx/>
+              <a:buChar char="-"/>
+            </a:pPr>
+            <a:r>
+              <a:rPr lang="en-US" sz="1350" dirty="0" err="1"/>
+              <a:t>Wt|s,Bachelor</a:t>
+            </a:r>
+            <a:r>
+              <a:rPr lang="en-US" sz="1350" dirty="0"/>
+              <a:t> = 112 out of 280 -&gt; 2.5</a:t>
+            </a:r>
+          </a:p>
+          <a:p>
+            <a:pPr marL="557213" lvl="1" indent="-214313">
+              <a:buFontTx/>
+              <a:buChar char="-"/>
+            </a:pPr>
+            <a:endParaRPr lang="en-US" sz="1350" dirty="0"/>
+          </a:p>
+        </p:txBody>
+      </p:sp>
+    </p:spTree>
+    <p:extLst>
+      <p:ext uri="{BB962C8B-B14F-4D97-AF65-F5344CB8AC3E}">
+        <p14:creationId xmlns:p14="http://schemas.microsoft.com/office/powerpoint/2010/main" val="1238131953"/>
       </p:ext>
     </p:extLst>
   </p:cSld>
@@ -6070,7 +6261,7 @@
       </p:grpSpPr>
       <p:pic>
         <p:nvPicPr>
-          <p:cNvPr id="8" name="Picture 7"/>
+          <p:cNvPr id="3" name="Picture 2"/>
           <p:cNvPicPr>
             <a:picLocks noChangeAspect="1" noChangeArrowheads="1"/>
           </p:cNvPicPr>
@@ -6103,14 +6294,14 @@
           </a:ln>
           <a:extLst>
             <a:ext uri="{909E8E84-426E-40dd-AFC4-6F175D3DCCD1}">
-              <a14:hiddenFill xmlns="" xmlns:a14="http://schemas.microsoft.com/office/drawing/2010/main">
+              <a14:hiddenFill xmlns:a14="http://schemas.microsoft.com/office/drawing/2010/main" xmlns="">
                 <a:solidFill>
                   <a:schemeClr val="accent1"/>
                 </a:solidFill>
               </a14:hiddenFill>
             </a:ext>
             <a:ext uri="{91240B29-F687-4f45-9708-019B960494DF}">
-              <a14:hiddenLine xmlns="" xmlns:a14="http://schemas.microsoft.com/office/drawing/2010/main" w="9525">
+              <a14:hiddenLine xmlns:a14="http://schemas.microsoft.com/office/drawing/2010/main" xmlns="" w="9525">
                 <a:solidFill>
                   <a:schemeClr val="tx1"/>
                 </a:solidFill>
@@ -6134,12 +6325,14 @@
         </p:nvSpPr>
         <p:spPr/>
         <p:txBody>
-          <a:bodyPr/>
-          <a:lstStyle/>
-          <a:p>
-            <a:r>
-              <a:rPr lang="en-US" dirty="0"/>
-              <a:t>Variance estimation using weights</a:t>
+          <a:bodyPr>
+            <a:normAutofit fontScale="90000"/>
+          </a:bodyPr>
+          <a:lstStyle/>
+          <a:p>
+            <a:r>
+              <a:rPr lang="en-US" dirty="0"/>
+              <a:t>Variance estimation – constructing weights</a:t>
             </a:r>
             <a:endParaRPr lang="nl-NL" dirty="0"/>
           </a:p>
@@ -6153,7 +6346,7 @@
         </p:nvSpPr>
         <p:spPr>
           <a:xfrm>
-            <a:off x="3812720" y="3415222"/>
+            <a:off x="3812720" y="3211610"/>
             <a:ext cx="4490358" cy="923330"/>
           </a:xfrm>
           <a:prstGeom prst="rect">
@@ -6175,7 +6368,7 @@
             </a:pPr>
             <a:r>
               <a:rPr lang="en-US" sz="1350" dirty="0"/>
-              <a:t>Stage 1: clusters out of strata</a:t>
+              <a:t>Stage 1: clusters out of population</a:t>
             </a:r>
           </a:p>
           <a:p>
@@ -6253,8 +6446,8 @@
         </p:nvSpPr>
         <p:spPr>
           <a:xfrm>
-            <a:off x="3812720" y="2164378"/>
-            <a:ext cx="4490358" cy="1131079"/>
+            <a:off x="3812720" y="2164377"/>
+            <a:ext cx="4490358" cy="923330"/>
           </a:xfrm>
           <a:prstGeom prst="rect">
             <a:avLst/>
@@ -6312,11 +6505,128 @@
               <a:t> = 112 out of 280 -&gt; 2.5</a:t>
             </a:r>
           </a:p>
+        </p:txBody>
+      </p:sp>
+      <p:sp>
+        <p:nvSpPr>
+          <p:cNvPr id="8" name="TextBox 7"/>
+          <p:cNvSpPr txBox="1"/>
+          <p:nvPr/>
+        </p:nvSpPr>
+        <p:spPr>
+          <a:xfrm>
+            <a:off x="3812720" y="4111857"/>
+            <a:ext cx="4490358" cy="1754326"/>
+          </a:xfrm>
+          <a:prstGeom prst="rect">
+            <a:avLst/>
+          </a:prstGeom>
+          <a:solidFill>
+            <a:schemeClr val="bg1"/>
+          </a:solidFill>
+        </p:spPr>
+        <p:txBody>
+          <a:bodyPr wrap="square" rtlCol="0">
+            <a:spAutoFit/>
+          </a:bodyPr>
+          <a:lstStyle/>
+          <a:p>
+            <a:pPr marL="214313" indent="-214313">
+              <a:buFontTx/>
+              <a:buChar char="-"/>
+            </a:pPr>
+            <a:r>
+              <a:rPr lang="en-US" sz="1350" dirty="0"/>
+              <a:t>Total weight</a:t>
+            </a:r>
+          </a:p>
           <a:p>
             <a:pPr marL="557213" lvl="1" indent="-214313">
               <a:buFontTx/>
               <a:buChar char="-"/>
             </a:pPr>
+            <a:r>
+              <a:rPr lang="en-US" sz="1350" dirty="0" err="1"/>
+              <a:t>Wt|s,master</a:t>
+            </a:r>
+            <a:r>
+              <a:rPr lang="en-US" sz="1350" dirty="0"/>
+              <a:t> = 2.5 * 18.75 -&gt; 46.875</a:t>
+            </a:r>
+          </a:p>
+          <a:p>
+            <a:pPr marL="557213" lvl="1" indent="-214313">
+              <a:buFontTx/>
+              <a:buChar char="-"/>
+            </a:pPr>
+            <a:r>
+              <a:rPr lang="en-US" sz="1350" dirty="0" err="1"/>
+              <a:t>Wt|s,Bachelor</a:t>
+            </a:r>
+            <a:r>
+              <a:rPr lang="en-US" sz="1350" dirty="0"/>
+              <a:t> = 2.5 * 6.25 -&gt; 18.75</a:t>
+            </a:r>
+          </a:p>
+          <a:p>
+            <a:pPr marL="214313" indent="-214313">
+              <a:buFontTx/>
+              <a:buChar char="-"/>
+            </a:pPr>
+            <a:r>
+              <a:rPr lang="en-US" sz="1350" dirty="0"/>
+              <a:t>Rescaled weight</a:t>
+            </a:r>
+          </a:p>
+          <a:p>
+            <a:pPr marL="557213" lvl="1" indent="-214313">
+              <a:buFontTx/>
+              <a:buChar char="-"/>
+            </a:pPr>
+            <a:r>
+              <a:rPr lang="en-US" sz="1350" dirty="0" err="1"/>
+              <a:t>Wt|s,master</a:t>
+            </a:r>
+            <a:r>
+              <a:rPr lang="en-US" sz="1350" dirty="0"/>
+              <a:t> = 46.875/mean(</a:t>
+            </a:r>
+            <a:r>
+              <a:rPr lang="en-US" sz="1350" dirty="0" err="1"/>
+              <a:t>Wt</a:t>
+            </a:r>
+            <a:r>
+              <a:rPr lang="en-US" sz="1350" dirty="0"/>
+              <a:t>) = 2,42</a:t>
+            </a:r>
+          </a:p>
+          <a:p>
+            <a:pPr marL="557213" lvl="1" indent="-214313">
+              <a:buFontTx/>
+              <a:buChar char="-"/>
+            </a:pPr>
+            <a:r>
+              <a:rPr lang="en-US" sz="1350" dirty="0" err="1"/>
+              <a:t>Wt|s,Bachelor</a:t>
+            </a:r>
+            <a:r>
+              <a:rPr lang="en-US" sz="1350" dirty="0"/>
+              <a:t> = 18.75/mean(</a:t>
+            </a:r>
+            <a:r>
+              <a:rPr lang="en-US" sz="1350" dirty="0" err="1"/>
+              <a:t>Wt</a:t>
+            </a:r>
+            <a:r>
+              <a:rPr lang="en-US" sz="1350" dirty="0"/>
+              <a:t>)= 0,81</a:t>
+            </a:r>
+          </a:p>
+          <a:p>
+            <a:endParaRPr lang="en-US" sz="1350" dirty="0"/>
+          </a:p>
+          <a:p>
+            <a:pPr lvl="1"/>
             <a:endParaRPr lang="en-US" sz="1350" dirty="0"/>
           </a:p>
         </p:txBody>
@@ -6324,7 +6634,7 @@
     </p:spTree>
     <p:extLst>
       <p:ext uri="{BB962C8B-B14F-4D97-AF65-F5344CB8AC3E}">
-        <p14:creationId xmlns:p14="http://schemas.microsoft.com/office/powerpoint/2010/main" val="1238131953"/>
+        <p14:creationId xmlns:p14="http://schemas.microsoft.com/office/powerpoint/2010/main" val="167194641"/>
       </p:ext>
     </p:extLst>
   </p:cSld>
@@ -6461,14 +6771,14 @@
           </a:ln>
           <a:extLst>
             <a:ext uri="{909E8E84-426E-40dd-AFC4-6F175D3DCCD1}">
-              <a14:hiddenFill xmlns="" xmlns:a14="http://schemas.microsoft.com/office/drawing/2010/main">
+              <a14:hiddenFill xmlns:a14="http://schemas.microsoft.com/office/drawing/2010/main" xmlns="">
                 <a:solidFill>
                   <a:schemeClr val="accent1"/>
                 </a:solidFill>
               </a14:hiddenFill>
             </a:ext>
             <a:ext uri="{91240B29-F687-4f45-9708-019B960494DF}">
-              <a14:hiddenLine xmlns="" xmlns:a14="http://schemas.microsoft.com/office/drawing/2010/main" w="9525">
+              <a14:hiddenLine xmlns:a14="http://schemas.microsoft.com/office/drawing/2010/main" xmlns="" w="9525">
                 <a:solidFill>
                   <a:schemeClr val="tx1"/>
                 </a:solidFill>
@@ -6499,76 +6809,9 @@
           <a:p>
             <a:r>
               <a:rPr lang="en-US" dirty="0"/>
-              <a:t>Variance estimation – constructing weights</a:t>
+              <a:t>Variance estimation in R – identical results</a:t>
             </a:r>
             <a:endParaRPr lang="nl-NL" dirty="0"/>
-          </a:p>
-        </p:txBody>
-      </p:sp>
-      <p:sp>
-        <p:nvSpPr>
-          <p:cNvPr id="4" name="TextBox 3"/>
-          <p:cNvSpPr txBox="1"/>
-          <p:nvPr/>
-        </p:nvSpPr>
-        <p:spPr>
-          <a:xfrm>
-            <a:off x="3812720" y="3211610"/>
-            <a:ext cx="4490358" cy="923330"/>
-          </a:xfrm>
-          <a:prstGeom prst="rect">
-            <a:avLst/>
-          </a:prstGeom>
-          <a:solidFill>
-            <a:schemeClr val="bg1"/>
-          </a:solidFill>
-        </p:spPr>
-        <p:txBody>
-          <a:bodyPr wrap="square" rtlCol="0">
-            <a:spAutoFit/>
-          </a:bodyPr>
-          <a:lstStyle/>
-          <a:p>
-            <a:pPr marL="214313" indent="-214313">
-              <a:buFontTx/>
-              <a:buChar char="-"/>
-            </a:pPr>
-            <a:r>
-              <a:rPr lang="en-US" sz="1350" dirty="0"/>
-              <a:t>Stage 1: clusters out of population</a:t>
-            </a:r>
-          </a:p>
-          <a:p>
-            <a:pPr marL="557213" lvl="1" indent="-214313">
-              <a:buFontTx/>
-              <a:buChar char="-"/>
-            </a:pPr>
-            <a:r>
-              <a:rPr lang="en-US" sz="1350" dirty="0" err="1"/>
-              <a:t>Wt|s,master</a:t>
-            </a:r>
-            <a:r>
-              <a:rPr lang="en-US" sz="1350" dirty="0"/>
-              <a:t> = 8 out of 150 -&gt; 18.75</a:t>
-            </a:r>
-          </a:p>
-          <a:p>
-            <a:pPr marL="557213" lvl="1" indent="-214313">
-              <a:buFontTx/>
-              <a:buChar char="-"/>
-            </a:pPr>
-            <a:r>
-              <a:rPr lang="en-US" sz="1350" dirty="0" err="1"/>
-              <a:t>Wt|s,Bachelor</a:t>
-            </a:r>
-            <a:r>
-              <a:rPr lang="en-US" sz="1350" dirty="0"/>
-              <a:t> = 8 out of 50 -&gt; 6,25</a:t>
-            </a:r>
-          </a:p>
-          <a:p>
-            <a:pPr lvl="1"/>
-            <a:endParaRPr lang="en-US" sz="1350" dirty="0"/>
           </a:p>
         </p:txBody>
       </p:sp>
@@ -6613,8 +6856,8 @@
         </p:nvSpPr>
         <p:spPr>
           <a:xfrm>
-            <a:off x="3812720" y="2164377"/>
-            <a:ext cx="4490358" cy="923330"/>
+            <a:off x="3812720" y="2164378"/>
+            <a:ext cx="5275621" cy="507831"/>
           </a:xfrm>
           <a:prstGeom prst="rect">
             <a:avLst/>
@@ -6631,45 +6874,57 @@
           <a:p>
             <a:r>
               <a:rPr lang="en-US" sz="1350" dirty="0"/>
-              <a:t>- Weights:</a:t>
-            </a:r>
-          </a:p>
-          <a:p>
-            <a:pPr marL="214313" indent="-214313">
-              <a:buFontTx/>
-              <a:buChar char="-"/>
-            </a:pPr>
+              <a:t>clus2a &lt;- </a:t>
+            </a:r>
+            <a:r>
+              <a:rPr lang="en-US" sz="1350" dirty="0" err="1"/>
+              <a:t>svydesign</a:t>
+            </a:r>
             <a:r>
               <a:rPr lang="en-US" sz="1350" dirty="0"/>
-              <a:t>Stage 2: per cluster: </a:t>
-            </a:r>
-          </a:p>
-          <a:p>
-            <a:pPr marL="557213" lvl="1" indent="-214313">
-              <a:buFontTx/>
-              <a:buChar char="-"/>
-            </a:pPr>
+              <a:t>(ids=~</a:t>
+            </a:r>
             <a:r>
               <a:rPr lang="en-US" sz="1350" dirty="0" err="1"/>
-              <a:t>Wt|s,master</a:t>
+              <a:t>cluster+id</a:t>
             </a:r>
             <a:r>
               <a:rPr lang="en-US" sz="1350" dirty="0"/>
-              <a:t> = 15 out of 40 -&gt; 2.5</a:t>
-            </a:r>
-          </a:p>
-          <a:p>
-            <a:pPr marL="557213" lvl="1" indent="-214313">
-              <a:buFontTx/>
-              <a:buChar char="-"/>
-            </a:pPr>
+              <a:t>, strata=~</a:t>
+            </a:r>
             <a:r>
               <a:rPr lang="en-US" sz="1350" dirty="0" err="1"/>
-              <a:t>Wt|s,Bachelor</a:t>
+              <a:t>programme</a:t>
             </a:r>
             <a:r>
               <a:rPr lang="en-US" sz="1350" dirty="0"/>
-              <a:t> = 112 out of 280 -&gt; 2.5</a:t>
+              <a:t>,</a:t>
+            </a:r>
+          </a:p>
+          <a:p>
+            <a:r>
+              <a:rPr lang="en-US" sz="1350" dirty="0">
+                <a:solidFill>
+                  <a:srgbClr val="00B050"/>
+                </a:solidFill>
+              </a:rPr>
+              <a:t>                #   weights=~weights, </a:t>
+            </a:r>
+            <a:r>
+              <a:rPr lang="en-US" sz="1350" dirty="0" err="1"/>
+              <a:t>fpc</a:t>
+            </a:r>
+            <a:r>
+              <a:rPr lang="en-US" sz="1350" dirty="0"/>
+              <a:t> = ~fpc1+fpc2, data=</a:t>
+            </a:r>
+            <a:r>
+              <a:rPr lang="en-US" sz="1350" dirty="0" err="1"/>
+              <a:t>dataclustersrs</a:t>
+            </a:r>
+            <a:r>
+              <a:rPr lang="en-US" sz="1350" dirty="0"/>
+              <a:t>)</a:t>
             </a:r>
           </a:p>
         </p:txBody>
@@ -6683,7 +6938,7 @@
         <p:spPr>
           <a:xfrm>
             <a:off x="3812720" y="4111857"/>
-            <a:ext cx="4490358" cy="1754326"/>
+            <a:ext cx="5149745" cy="1754326"/>
           </a:xfrm>
           <a:prstGeom prst="rect">
             <a:avLst/>
@@ -6698,102 +6953,122 @@
           </a:bodyPr>
           <a:lstStyle/>
           <a:p>
-            <a:pPr marL="214313" indent="-214313">
-              <a:buFontTx/>
-              <a:buChar char="-"/>
-            </a:pPr>
             <a:r>
               <a:rPr lang="en-US" sz="1350" dirty="0"/>
-              <a:t>Total weight</a:t>
-            </a:r>
-          </a:p>
-          <a:p>
-            <a:pPr marL="557213" lvl="1" indent="-214313">
-              <a:buFontTx/>
-              <a:buChar char="-"/>
-            </a:pPr>
+              <a:t>Clus2b &lt;- </a:t>
+            </a:r>
             <a:r>
               <a:rPr lang="en-US" sz="1350" dirty="0" err="1"/>
-              <a:t>Wt|s,master</a:t>
+              <a:t>svydesign</a:t>
             </a:r>
             <a:r>
               <a:rPr lang="en-US" sz="1350" dirty="0"/>
-              <a:t> = 2.5 * 18.75 -&gt; 46.875</a:t>
-            </a:r>
-          </a:p>
-          <a:p>
-            <a:pPr marL="557213" lvl="1" indent="-214313">
-              <a:buFontTx/>
-              <a:buChar char="-"/>
-            </a:pPr>
+              <a:t>(ids=~</a:t>
+            </a:r>
             <a:r>
               <a:rPr lang="en-US" sz="1350" dirty="0" err="1"/>
-              <a:t>Wt|s,Bachelor</a:t>
+              <a:t>cluster+id</a:t>
             </a:r>
             <a:r>
               <a:rPr lang="en-US" sz="1350" dirty="0"/>
-              <a:t> = 2.5 * 6.25 -&gt; 18.75</a:t>
-            </a:r>
-          </a:p>
-          <a:p>
-            <a:pPr marL="214313" indent="-214313">
-              <a:buFontTx/>
-              <a:buChar char="-"/>
-            </a:pPr>
+              <a:t>,  </a:t>
+            </a:r>
+            <a:r>
+              <a:rPr lang="en-US" sz="1350" dirty="0">
+                <a:solidFill>
+                  <a:srgbClr val="00B050"/>
+                </a:solidFill>
+              </a:rPr>
+              <a:t>#strata=~dataclustersrs$V2,</a:t>
+            </a:r>
+          </a:p>
+          <a:p>
             <a:r>
               <a:rPr lang="en-US" sz="1350" dirty="0"/>
-              <a:t>Rescaled weight</a:t>
-            </a:r>
-          </a:p>
-          <a:p>
-            <a:pPr marL="557213" lvl="1" indent="-214313">
-              <a:buFontTx/>
-              <a:buChar char="-"/>
-            </a:pPr>
+              <a:t>                   weights=~weights,</a:t>
+            </a:r>
+            <a:r>
+              <a:rPr lang="en-US" sz="1350" dirty="0">
+                <a:solidFill>
+                  <a:srgbClr val="00B050"/>
+                </a:solidFill>
+              </a:rPr>
+              <a:t>#  </a:t>
+            </a:r>
+            <a:r>
+              <a:rPr lang="en-US" sz="1350" dirty="0" err="1">
+                <a:solidFill>
+                  <a:srgbClr val="00B050"/>
+                </a:solidFill>
+              </a:rPr>
+              <a:t>fpc</a:t>
+            </a:r>
+            <a:r>
+              <a:rPr lang="en-US" sz="1350" dirty="0">
+                <a:solidFill>
+                  <a:srgbClr val="00B050"/>
+                </a:solidFill>
+              </a:rPr>
+              <a:t> = ~fpc1+ffpc2,</a:t>
+            </a:r>
+            <a:r>
+              <a:rPr lang="en-US" sz="1350" dirty="0"/>
+              <a:t>data=</a:t>
+            </a:r>
             <a:r>
               <a:rPr lang="en-US" sz="1350" dirty="0" err="1"/>
-              <a:t>Wt|s,master</a:t>
+              <a:t>dataclustersrs</a:t>
             </a:r>
             <a:r>
               <a:rPr lang="en-US" sz="1350" dirty="0"/>
-              <a:t> = 46.875/mean(</a:t>
-            </a:r>
-            <a:r>
-              <a:rPr lang="en-US" sz="1350" dirty="0" err="1"/>
-              <a:t>Wt</a:t>
-            </a:r>
-            <a:r>
-              <a:rPr lang="en-US" sz="1350" dirty="0"/>
-              <a:t>) = 2,42</a:t>
-            </a:r>
-          </a:p>
-          <a:p>
-            <a:pPr marL="557213" lvl="1" indent="-214313">
-              <a:buFontTx/>
-              <a:buChar char="-"/>
-            </a:pPr>
-            <a:r>
-              <a:rPr lang="en-US" sz="1350" dirty="0" err="1"/>
-              <a:t>Wt|s,Bachelor</a:t>
-            </a:r>
-            <a:r>
-              <a:rPr lang="en-US" sz="1350" dirty="0"/>
-              <a:t> = 18.75/mean(</a:t>
-            </a:r>
-            <a:r>
-              <a:rPr lang="en-US" sz="1350" dirty="0" err="1"/>
-              <a:t>Wt</a:t>
-            </a:r>
-            <a:r>
-              <a:rPr lang="en-US" sz="1350" dirty="0"/>
-              <a:t>)= 0,81</a:t>
+              <a:t>)</a:t>
             </a:r>
           </a:p>
           <a:p>
             <a:endParaRPr lang="en-US" sz="1350" dirty="0"/>
           </a:p>
           <a:p>
-            <a:pPr lvl="1"/>
+            <a:r>
+              <a:rPr lang="en-US" sz="1350" dirty="0">
+                <a:solidFill>
+                  <a:srgbClr val="FF0000"/>
+                </a:solidFill>
+              </a:rPr>
+              <a:t>Mean: 6.04</a:t>
+            </a:r>
+          </a:p>
+          <a:p>
+            <a:r>
+              <a:rPr lang="en-US" sz="1350" dirty="0">
+                <a:solidFill>
+                  <a:srgbClr val="FF0000"/>
+                </a:solidFill>
+              </a:rPr>
+              <a:t>s.e. = .15275</a:t>
+            </a:r>
+          </a:p>
+          <a:p>
+            <a:r>
+              <a:rPr lang="en-US" sz="1350" dirty="0" err="1">
+                <a:solidFill>
+                  <a:srgbClr val="FF0000"/>
+                </a:solidFill>
+              </a:rPr>
+              <a:t>Deff</a:t>
+            </a:r>
+            <a:r>
+              <a:rPr lang="en-US" sz="1350" dirty="0">
+                <a:solidFill>
+                  <a:srgbClr val="FF0000"/>
+                </a:solidFill>
+              </a:rPr>
+              <a:t>= 8.86</a:t>
+            </a:r>
+          </a:p>
+          <a:p>
+            <a:endParaRPr lang="en-US" sz="1350" dirty="0"/>
+          </a:p>
+          <a:p>
             <a:endParaRPr lang="en-US" sz="1350" dirty="0"/>
           </a:p>
         </p:txBody>
@@ -6801,7 +7076,7 @@
     </p:spTree>
     <p:extLst>
       <p:ext uri="{BB962C8B-B14F-4D97-AF65-F5344CB8AC3E}">
-        <p14:creationId xmlns:p14="http://schemas.microsoft.com/office/powerpoint/2010/main" val="167194641"/>
+        <p14:creationId xmlns:p14="http://schemas.microsoft.com/office/powerpoint/2010/main" val="1250024273"/>
       </p:ext>
     </p:extLst>
   </p:cSld>
@@ -6903,60 +7178,6 @@
           <a:chExt cx="0" cy="0"/>
         </a:xfrm>
       </p:grpSpPr>
-      <p:pic>
-        <p:nvPicPr>
-          <p:cNvPr id="3" name="Picture 2"/>
-          <p:cNvPicPr>
-            <a:picLocks noChangeAspect="1" noChangeArrowheads="1"/>
-          </p:cNvPicPr>
-          <p:nvPr/>
-        </p:nvPicPr>
-        <p:blipFill>
-          <a:blip r:embed="rId2">
-            <a:extLst>
-              <a:ext uri="{28A0092B-C50C-407E-A947-70E740481C1C}">
-                <a14:useLocalDpi xmlns:a14="http://schemas.microsoft.com/office/drawing/2010/main" val="0"/>
-              </a:ext>
-            </a:extLst>
-          </a:blip>
-          <a:srcRect/>
-          <a:stretch>
-            <a:fillRect/>
-          </a:stretch>
-        </p:blipFill>
-        <p:spPr bwMode="auto">
-          <a:xfrm>
-            <a:off x="0" y="1784082"/>
-            <a:ext cx="4906736" cy="4089943"/>
-          </a:xfrm>
-          <a:prstGeom prst="rect">
-            <a:avLst/>
-          </a:prstGeom>
-          <a:noFill/>
-          <a:ln>
-            <a:noFill/>
-          </a:ln>
-          <a:extLst>
-            <a:ext uri="{909E8E84-426E-40dd-AFC4-6F175D3DCCD1}">
-              <a14:hiddenFill xmlns="" xmlns:a14="http://schemas.microsoft.com/office/drawing/2010/main">
-                <a:solidFill>
-                  <a:schemeClr val="accent1"/>
-                </a:solidFill>
-              </a14:hiddenFill>
-            </a:ext>
-            <a:ext uri="{91240B29-F687-4f45-9708-019B960494DF}">
-              <a14:hiddenLine xmlns="" xmlns:a14="http://schemas.microsoft.com/office/drawing/2010/main" w="9525">
-                <a:solidFill>
-                  <a:schemeClr val="tx1"/>
-                </a:solidFill>
-                <a:miter lim="800000"/>
-                <a:headEnd/>
-                <a:tailEnd/>
-              </a14:hiddenLine>
-            </a:ext>
-          </a:extLst>
-        </p:spPr>
-      </p:pic>
       <p:sp>
         <p:nvSpPr>
           <p:cNvPr id="2" name="Title 1"/>
@@ -6969,362 +7190,159 @@
         </p:nvSpPr>
         <p:spPr/>
         <p:txBody>
+          <a:bodyPr/>
+          <a:lstStyle/>
+          <a:p>
+            <a:r>
+              <a:rPr lang="en-US" dirty="0"/>
+              <a:t>Weights</a:t>
+            </a:r>
+            <a:endParaRPr lang="nl-NL" dirty="0"/>
+          </a:p>
+        </p:txBody>
+      </p:sp>
+      <p:sp>
+        <p:nvSpPr>
+          <p:cNvPr id="3" name="Content Placeholder 2"/>
+          <p:cNvSpPr>
+            <a:spLocks noGrp="1"/>
+          </p:cNvSpPr>
+          <p:nvPr>
+            <p:ph idx="1"/>
+          </p:nvPr>
+        </p:nvSpPr>
+        <p:spPr/>
+        <p:txBody>
           <a:bodyPr>
-            <a:normAutofit fontScale="90000"/>
+            <a:normAutofit fontScale="77500" lnSpcReduction="20000"/>
           </a:bodyPr>
           <a:lstStyle/>
           <a:p>
             <a:r>
               <a:rPr lang="en-US" dirty="0"/>
-              <a:t>Variance estimation in R – identical results</a:t>
-            </a:r>
+              <a:t>The study doesn’t stop at sampling</a:t>
+            </a:r>
+          </a:p>
+          <a:p>
+            <a:pPr lvl="1"/>
+            <a:r>
+              <a:rPr lang="en-US" dirty="0"/>
+              <a:t>nonresponse weights (see week 44,45)</a:t>
+            </a:r>
+          </a:p>
+          <a:p>
+            <a:r>
+              <a:rPr lang="en-US" dirty="0"/>
+              <a:t>Variance in weights indication of difference with perfect SRS design without nonresponse</a:t>
+            </a:r>
+          </a:p>
+          <a:p>
+            <a:pPr lvl="1"/>
+            <a:r>
+              <a:rPr lang="en-US" dirty="0"/>
+              <a:t>In SRS -&gt; Wi=1, </a:t>
+            </a:r>
+            <a:r>
+              <a:rPr lang="en-US" dirty="0" err="1"/>
+              <a:t>Var</a:t>
+            </a:r>
+            <a:r>
+              <a:rPr lang="en-US" dirty="0"/>
+              <a:t>(weights)=0.</a:t>
+            </a:r>
+          </a:p>
+          <a:p>
+            <a:pPr lvl="1"/>
+            <a:r>
+              <a:rPr lang="en-US" dirty="0"/>
+              <a:t>In our design -&gt; </a:t>
+            </a:r>
+            <a:r>
+              <a:rPr lang="en-US" dirty="0" err="1"/>
+              <a:t>Var</a:t>
+            </a:r>
+            <a:r>
+              <a:rPr lang="en-US" dirty="0"/>
+              <a:t>(weights)=.27</a:t>
+            </a:r>
+          </a:p>
+          <a:p>
+            <a:pPr lvl="1"/>
+            <a:r>
+              <a:rPr lang="en-US" dirty="0"/>
+              <a:t>Likely in our design with NR: </a:t>
+            </a:r>
+            <a:r>
+              <a:rPr lang="en-US" dirty="0" err="1"/>
+              <a:t>Var</a:t>
+            </a:r>
+            <a:r>
+              <a:rPr lang="en-US" dirty="0"/>
+              <a:t>(weights) &gt;.27</a:t>
+            </a:r>
+          </a:p>
+          <a:p>
+            <a:pPr lvl="2"/>
+            <a:r>
+              <a:rPr lang="en-US" dirty="0"/>
+              <a:t>Variance inflation</a:t>
+            </a:r>
+          </a:p>
+          <a:p>
+            <a:pPr lvl="2"/>
+            <a:endParaRPr lang="en-US" dirty="0"/>
+          </a:p>
+          <a:p>
+            <a:r>
+              <a:rPr lang="en-US" dirty="0"/>
+              <a:t>Can trim weights if they are large (rescaled weights &gt;3 or 5)</a:t>
+            </a:r>
+          </a:p>
+          <a:p>
+            <a:pPr lvl="1"/>
+            <a:r>
+              <a:rPr lang="en-US" dirty="0"/>
+              <a:t>Bias becomes larger</a:t>
+            </a:r>
+          </a:p>
+          <a:p>
+            <a:pPr lvl="1"/>
+            <a:r>
+              <a:rPr lang="en-US" dirty="0"/>
+              <a:t>Variance lower -&gt; precision higher</a:t>
+            </a:r>
+          </a:p>
+          <a:p>
+            <a:pPr lvl="1"/>
+            <a:r>
+              <a:rPr lang="en-US" dirty="0"/>
+              <a:t>Goal is to Minimize Mean Square Error (bias² + variance)</a:t>
+            </a:r>
+          </a:p>
+          <a:p>
+            <a:pPr lvl="1"/>
+            <a:endParaRPr lang="en-US" dirty="0"/>
+          </a:p>
+          <a:p>
+            <a:pPr lvl="1"/>
+            <a:endParaRPr lang="en-US" dirty="0"/>
+          </a:p>
+          <a:p>
+            <a:pPr lvl="1"/>
             <a:endParaRPr lang="nl-NL" dirty="0"/>
-          </a:p>
-        </p:txBody>
-      </p:sp>
-      <p:cxnSp>
-        <p:nvCxnSpPr>
-          <p:cNvPr id="5" name="Straight Arrow Connector 4"/>
-          <p:cNvCxnSpPr/>
-          <p:nvPr/>
-        </p:nvCxnSpPr>
-        <p:spPr>
-          <a:xfrm flipV="1">
-            <a:off x="6662057" y="2645228"/>
-            <a:ext cx="8165" cy="449532"/>
-          </a:xfrm>
-          <a:prstGeom prst="straightConnector1">
-            <a:avLst/>
-          </a:prstGeom>
-          <a:ln>
-            <a:tailEnd type="arrow"/>
-          </a:ln>
-        </p:spPr>
-        <p:style>
-          <a:lnRef idx="1">
-            <a:schemeClr val="accent1"/>
-          </a:lnRef>
-          <a:fillRef idx="0">
-            <a:schemeClr val="accent1"/>
-          </a:fillRef>
-          <a:effectRef idx="0">
-            <a:schemeClr val="accent1"/>
-          </a:effectRef>
-          <a:fontRef idx="minor">
-            <a:schemeClr val="tx1"/>
-          </a:fontRef>
-        </p:style>
-      </p:cxnSp>
-      <p:sp>
-        <p:nvSpPr>
-          <p:cNvPr id="7" name="TextBox 6"/>
-          <p:cNvSpPr txBox="1"/>
-          <p:nvPr/>
-        </p:nvSpPr>
-        <p:spPr>
-          <a:xfrm>
-            <a:off x="3812720" y="2164378"/>
-            <a:ext cx="5275621" cy="507831"/>
-          </a:xfrm>
-          <a:prstGeom prst="rect">
-            <a:avLst/>
-          </a:prstGeom>
-          <a:solidFill>
-            <a:schemeClr val="bg1"/>
-          </a:solidFill>
-        </p:spPr>
-        <p:txBody>
-          <a:bodyPr wrap="square" rtlCol="0">
-            <a:spAutoFit/>
-          </a:bodyPr>
-          <a:lstStyle/>
-          <a:p>
-            <a:r>
-              <a:rPr lang="en-US" sz="1350" dirty="0"/>
-              <a:t>clus2a &lt;- </a:t>
-            </a:r>
-            <a:r>
-              <a:rPr lang="en-US" sz="1350" dirty="0" err="1"/>
-              <a:t>svydesign</a:t>
-            </a:r>
-            <a:r>
-              <a:rPr lang="en-US" sz="1350" dirty="0"/>
-              <a:t>(ids=~</a:t>
-            </a:r>
-            <a:r>
-              <a:rPr lang="en-US" sz="1350" dirty="0" err="1"/>
-              <a:t>cluster+id</a:t>
-            </a:r>
-            <a:r>
-              <a:rPr lang="en-US" sz="1350" dirty="0"/>
-              <a:t>, strata=~</a:t>
-            </a:r>
-            <a:r>
-              <a:rPr lang="en-US" sz="1350" dirty="0" err="1"/>
-              <a:t>programme</a:t>
-            </a:r>
-            <a:r>
-              <a:rPr lang="en-US" sz="1350" dirty="0"/>
-              <a:t>,</a:t>
-            </a:r>
-          </a:p>
-          <a:p>
-            <a:r>
-              <a:rPr lang="en-US" sz="1350" dirty="0">
-                <a:solidFill>
-                  <a:srgbClr val="00B050"/>
-                </a:solidFill>
-              </a:rPr>
-              <a:t>                #   weights=~weights, </a:t>
-            </a:r>
-            <a:r>
-              <a:rPr lang="en-US" sz="1350" dirty="0" err="1"/>
-              <a:t>fpc</a:t>
-            </a:r>
-            <a:r>
-              <a:rPr lang="en-US" sz="1350" dirty="0"/>
-              <a:t> = ~fpc1+fpc2, data=</a:t>
-            </a:r>
-            <a:r>
-              <a:rPr lang="en-US" sz="1350" dirty="0" err="1"/>
-              <a:t>dataclustersrs</a:t>
-            </a:r>
-            <a:r>
-              <a:rPr lang="en-US" sz="1350" dirty="0"/>
-              <a:t>)</a:t>
-            </a:r>
-          </a:p>
-        </p:txBody>
-      </p:sp>
-      <p:sp>
-        <p:nvSpPr>
-          <p:cNvPr id="8" name="TextBox 7"/>
-          <p:cNvSpPr txBox="1"/>
-          <p:nvPr/>
-        </p:nvSpPr>
-        <p:spPr>
-          <a:xfrm>
-            <a:off x="3812720" y="4111857"/>
-            <a:ext cx="5149745" cy="1754326"/>
-          </a:xfrm>
-          <a:prstGeom prst="rect">
-            <a:avLst/>
-          </a:prstGeom>
-          <a:solidFill>
-            <a:schemeClr val="bg1"/>
-          </a:solidFill>
-        </p:spPr>
-        <p:txBody>
-          <a:bodyPr wrap="square" rtlCol="0">
-            <a:spAutoFit/>
-          </a:bodyPr>
-          <a:lstStyle/>
-          <a:p>
-            <a:r>
-              <a:rPr lang="en-US" sz="1350" dirty="0"/>
-              <a:t>Clus2b &lt;- </a:t>
-            </a:r>
-            <a:r>
-              <a:rPr lang="en-US" sz="1350" dirty="0" err="1"/>
-              <a:t>svydesign</a:t>
-            </a:r>
-            <a:r>
-              <a:rPr lang="en-US" sz="1350" dirty="0"/>
-              <a:t>(ids=~</a:t>
-            </a:r>
-            <a:r>
-              <a:rPr lang="en-US" sz="1350" dirty="0" err="1"/>
-              <a:t>cluster+id</a:t>
-            </a:r>
-            <a:r>
-              <a:rPr lang="en-US" sz="1350" dirty="0"/>
-              <a:t>,  </a:t>
-            </a:r>
-            <a:r>
-              <a:rPr lang="en-US" sz="1350" dirty="0">
-                <a:solidFill>
-                  <a:srgbClr val="00B050"/>
-                </a:solidFill>
-              </a:rPr>
-              <a:t>#strata=~dataclustersrs$V2,</a:t>
-            </a:r>
-          </a:p>
-          <a:p>
-            <a:r>
-              <a:rPr lang="en-US" sz="1350" dirty="0"/>
-              <a:t>                   weights=~weights,</a:t>
-            </a:r>
-            <a:r>
-              <a:rPr lang="en-US" sz="1350" dirty="0">
-                <a:solidFill>
-                  <a:srgbClr val="00B050"/>
-                </a:solidFill>
-              </a:rPr>
-              <a:t>#  </a:t>
-            </a:r>
-            <a:r>
-              <a:rPr lang="en-US" sz="1350" dirty="0" err="1">
-                <a:solidFill>
-                  <a:srgbClr val="00B050"/>
-                </a:solidFill>
-              </a:rPr>
-              <a:t>fpc</a:t>
-            </a:r>
-            <a:r>
-              <a:rPr lang="en-US" sz="1350" dirty="0">
-                <a:solidFill>
-                  <a:srgbClr val="00B050"/>
-                </a:solidFill>
-              </a:rPr>
-              <a:t> = ~fpc1+ffpc2,</a:t>
-            </a:r>
-            <a:r>
-              <a:rPr lang="en-US" sz="1350" dirty="0"/>
-              <a:t>data=</a:t>
-            </a:r>
-            <a:r>
-              <a:rPr lang="en-US" sz="1350" dirty="0" err="1"/>
-              <a:t>dataclustersrs</a:t>
-            </a:r>
-            <a:r>
-              <a:rPr lang="en-US" sz="1350" dirty="0"/>
-              <a:t>)</a:t>
-            </a:r>
-          </a:p>
-          <a:p>
-            <a:endParaRPr lang="en-US" sz="1350" dirty="0"/>
-          </a:p>
-          <a:p>
-            <a:r>
-              <a:rPr lang="en-US" sz="1350" dirty="0">
-                <a:solidFill>
-                  <a:srgbClr val="FF0000"/>
-                </a:solidFill>
-              </a:rPr>
-              <a:t>Mean: 6.04</a:t>
-            </a:r>
-          </a:p>
-          <a:p>
-            <a:r>
-              <a:rPr lang="en-US" sz="1350" dirty="0">
-                <a:solidFill>
-                  <a:srgbClr val="FF0000"/>
-                </a:solidFill>
-              </a:rPr>
-              <a:t>s.e. = .15275</a:t>
-            </a:r>
-          </a:p>
-          <a:p>
-            <a:r>
-              <a:rPr lang="en-US" sz="1350" dirty="0" err="1">
-                <a:solidFill>
-                  <a:srgbClr val="FF0000"/>
-                </a:solidFill>
-              </a:rPr>
-              <a:t>Deff</a:t>
-            </a:r>
-            <a:r>
-              <a:rPr lang="en-US" sz="1350" dirty="0">
-                <a:solidFill>
-                  <a:srgbClr val="FF0000"/>
-                </a:solidFill>
-              </a:rPr>
-              <a:t>= 8.86</a:t>
-            </a:r>
-          </a:p>
-          <a:p>
-            <a:endParaRPr lang="en-US" sz="1350" dirty="0"/>
-          </a:p>
-          <a:p>
-            <a:endParaRPr lang="en-US" sz="1350" dirty="0"/>
           </a:p>
         </p:txBody>
       </p:sp>
     </p:spTree>
     <p:extLst>
       <p:ext uri="{BB962C8B-B14F-4D97-AF65-F5344CB8AC3E}">
-        <p14:creationId xmlns:p14="http://schemas.microsoft.com/office/powerpoint/2010/main" val="1250024273"/>
+        <p14:creationId xmlns:p14="http://schemas.microsoft.com/office/powerpoint/2010/main" val="2138226708"/>
       </p:ext>
     </p:extLst>
   </p:cSld>
   <p:clrMapOvr>
     <a:masterClrMapping/>
   </p:clrMapOvr>
-  <p:timing>
-    <p:tnLst>
-      <p:par>
-        <p:cTn id="1" dur="indefinite" restart="never" nodeType="tmRoot">
-          <p:childTnLst>
-            <p:seq concurrent="1" nextAc="seek">
-              <p:cTn id="2" dur="indefinite" nodeType="mainSeq">
-                <p:childTnLst>
-                  <p:par>
-                    <p:cTn id="3" fill="hold">
-                      <p:stCondLst>
-                        <p:cond delay="indefinite"/>
-                      </p:stCondLst>
-                      <p:childTnLst>
-                        <p:par>
-                          <p:cTn id="4" fill="hold">
-                            <p:stCondLst>
-                              <p:cond delay="0"/>
-                            </p:stCondLst>
-                            <p:childTnLst>
-                              <p:par>
-                                <p:cTn id="5" presetID="1" presetClass="entr" presetSubtype="0" fill="hold" nodeType="clickEffect">
-                                  <p:stCondLst>
-                                    <p:cond delay="0"/>
-                                  </p:stCondLst>
-                                  <p:childTnLst>
-                                    <p:set>
-                                      <p:cBhvr>
-                                        <p:cTn id="6" dur="1" fill="hold">
-                                          <p:stCondLst>
-                                            <p:cond delay="0"/>
-                                          </p:stCondLst>
-                                        </p:cTn>
-                                        <p:tgtEl>
-                                          <p:spTgt spid="5"/>
-                                        </p:tgtEl>
-                                        <p:attrNameLst>
-                                          <p:attrName>style.visibility</p:attrName>
-                                        </p:attrNameLst>
-                                      </p:cBhvr>
-                                      <p:to>
-                                        <p:strVal val="visible"/>
-                                      </p:to>
-                                    </p:set>
-                                  </p:childTnLst>
-                                </p:cTn>
-                              </p:par>
-                            </p:childTnLst>
-                          </p:cTn>
-                        </p:par>
-                      </p:childTnLst>
-                    </p:cTn>
-                  </p:par>
-                </p:childTnLst>
-              </p:cTn>
-              <p:prevCondLst>
-                <p:cond evt="onPrev" delay="0">
-                  <p:tgtEl>
-                    <p:sldTgt/>
-                  </p:tgtEl>
-                </p:cond>
-              </p:prevCondLst>
-              <p:nextCondLst>
-                <p:cond evt="onNext" delay="0">
-                  <p:tgtEl>
-                    <p:sldTgt/>
-                  </p:tgtEl>
-                </p:cond>
-              </p:nextCondLst>
-            </p:seq>
-          </p:childTnLst>
-        </p:cTn>
-      </p:par>
-    </p:tnLst>
-  </p:timing>
 </p:sld>
 </file>
 
@@ -7377,10 +7395,15 @@
             <p:ph idx="1"/>
           </p:nvPr>
         </p:nvSpPr>
-        <p:spPr/>
+        <p:spPr>
+          <a:xfrm>
+            <a:off x="457200" y="1600200"/>
+            <a:ext cx="8507288" cy="4525963"/>
+          </a:xfrm>
+        </p:spPr>
         <p:txBody>
           <a:bodyPr>
-            <a:normAutofit/>
+            <a:normAutofit lnSpcReduction="10000"/>
           </a:bodyPr>
           <a:lstStyle/>
           <a:p>
@@ -7394,6 +7417,40 @@
             <a:r>
               <a:rPr lang="en-US" dirty="0"/>
               <a:t>Your adopted survey</a:t>
+            </a:r>
+          </a:p>
+          <a:p>
+            <a:pPr lvl="1"/>
+            <a:r>
+              <a:rPr lang="en-US" dirty="0"/>
+              <a:t>Questions: what do </a:t>
+            </a:r>
+            <a:r>
+              <a:rPr lang="en-US"/>
+              <a:t>you encounter?</a:t>
+            </a:r>
+            <a:endParaRPr lang="en-US" dirty="0"/>
+          </a:p>
+          <a:p>
+            <a:r>
+              <a:rPr lang="en-US" dirty="0"/>
+              <a:t>Short lecture</a:t>
+            </a:r>
+          </a:p>
+          <a:p>
+            <a:pPr lvl="1"/>
+            <a:r>
+              <a:rPr lang="en-US" dirty="0"/>
+              <a:t>Survey design:</a:t>
+            </a:r>
+          </a:p>
+          <a:p>
+            <a:pPr marL="457200" lvl="1" indent="0">
+              <a:buNone/>
+            </a:pPr>
+            <a:r>
+              <a:rPr lang="en-US" dirty="0"/>
+              <a:t>   {population, question, frames} -&gt; modes</a:t>
             </a:r>
           </a:p>
           <a:p>
@@ -7455,191 +7512,6 @@
 </file>
 
 <file path=ppt/slides/slide20.xml><?xml version="1.0" encoding="utf-8"?>
-<p:sld xmlns:a="http://schemas.openxmlformats.org/drawingml/2006/main" xmlns:r="http://schemas.openxmlformats.org/officeDocument/2006/relationships" xmlns:p="http://schemas.openxmlformats.org/presentationml/2006/main">
-  <p:cSld>
-    <p:spTree>
-      <p:nvGrpSpPr>
-        <p:cNvPr id="1" name=""/>
-        <p:cNvGrpSpPr/>
-        <p:nvPr/>
-      </p:nvGrpSpPr>
-      <p:grpSpPr>
-        <a:xfrm>
-          <a:off x="0" y="0"/>
-          <a:ext cx="0" cy="0"/>
-          <a:chOff x="0" y="0"/>
-          <a:chExt cx="0" cy="0"/>
-        </a:xfrm>
-      </p:grpSpPr>
-      <p:sp>
-        <p:nvSpPr>
-          <p:cNvPr id="2" name="Title 1"/>
-          <p:cNvSpPr>
-            <a:spLocks noGrp="1"/>
-          </p:cNvSpPr>
-          <p:nvPr>
-            <p:ph type="title"/>
-          </p:nvPr>
-        </p:nvSpPr>
-        <p:spPr/>
-        <p:txBody>
-          <a:bodyPr/>
-          <a:lstStyle/>
-          <a:p>
-            <a:r>
-              <a:rPr lang="en-US" dirty="0"/>
-              <a:t>Weights</a:t>
-            </a:r>
-            <a:endParaRPr lang="nl-NL" dirty="0"/>
-          </a:p>
-        </p:txBody>
-      </p:sp>
-      <p:sp>
-        <p:nvSpPr>
-          <p:cNvPr id="3" name="Content Placeholder 2"/>
-          <p:cNvSpPr>
-            <a:spLocks noGrp="1"/>
-          </p:cNvSpPr>
-          <p:nvPr>
-            <p:ph idx="1"/>
-          </p:nvPr>
-        </p:nvSpPr>
-        <p:spPr/>
-        <p:txBody>
-          <a:bodyPr>
-            <a:normAutofit fontScale="77500" lnSpcReduction="20000"/>
-          </a:bodyPr>
-          <a:lstStyle/>
-          <a:p>
-            <a:r>
-              <a:rPr lang="en-US" dirty="0"/>
-              <a:t>The study doesn’t stop at sampling</a:t>
-            </a:r>
-          </a:p>
-          <a:p>
-            <a:pPr lvl="1"/>
-            <a:r>
-              <a:rPr lang="en-US" dirty="0"/>
-              <a:t>nonresponse weights (see week 44,45)</a:t>
-            </a:r>
-          </a:p>
-          <a:p>
-            <a:r>
-              <a:rPr lang="en-US" dirty="0"/>
-              <a:t>Variance in weights indication of difference with perfect SRS design without nonresponse</a:t>
-            </a:r>
-          </a:p>
-          <a:p>
-            <a:pPr lvl="1"/>
-            <a:r>
-              <a:rPr lang="en-US" dirty="0"/>
-              <a:t>In SRS -&gt; Wi=1, </a:t>
-            </a:r>
-            <a:r>
-              <a:rPr lang="en-US" dirty="0" err="1"/>
-              <a:t>Var</a:t>
-            </a:r>
-            <a:r>
-              <a:rPr lang="en-US" dirty="0"/>
-              <a:t>(weights)=0.</a:t>
-            </a:r>
-          </a:p>
-          <a:p>
-            <a:pPr lvl="1"/>
-            <a:r>
-              <a:rPr lang="en-US" dirty="0"/>
-              <a:t>In our design -&gt; </a:t>
-            </a:r>
-            <a:r>
-              <a:rPr lang="en-US" dirty="0" err="1"/>
-              <a:t>Var</a:t>
-            </a:r>
-            <a:r>
-              <a:rPr lang="en-US" dirty="0"/>
-              <a:t>(weights)=.27</a:t>
-            </a:r>
-          </a:p>
-          <a:p>
-            <a:pPr lvl="1"/>
-            <a:r>
-              <a:rPr lang="en-US" dirty="0"/>
-              <a:t>Likely in our design with NR: </a:t>
-            </a:r>
-            <a:r>
-              <a:rPr lang="en-US" dirty="0" err="1"/>
-              <a:t>Var</a:t>
-            </a:r>
-            <a:r>
-              <a:rPr lang="en-US" dirty="0"/>
-              <a:t>(weights) &gt;.27</a:t>
-            </a:r>
-          </a:p>
-          <a:p>
-            <a:pPr lvl="2"/>
-            <a:r>
-              <a:rPr lang="en-US" dirty="0"/>
-              <a:t>Variance inflation</a:t>
-            </a:r>
-          </a:p>
-          <a:p>
-            <a:pPr lvl="2"/>
-            <a:endParaRPr lang="en-US" dirty="0"/>
-          </a:p>
-          <a:p>
-            <a:r>
-              <a:rPr lang="en-US" dirty="0"/>
-              <a:t>Can trim weights if they are large (rescaled weights &gt;3 or 5)</a:t>
-            </a:r>
-          </a:p>
-          <a:p>
-            <a:pPr lvl="1"/>
-            <a:r>
-              <a:rPr lang="en-US" dirty="0"/>
-              <a:t>Bias becomes larger</a:t>
-            </a:r>
-          </a:p>
-          <a:p>
-            <a:pPr lvl="1"/>
-            <a:r>
-              <a:rPr lang="en-US" dirty="0"/>
-              <a:t>Variance lower -&gt; precision higher</a:t>
-            </a:r>
-          </a:p>
-          <a:p>
-            <a:pPr lvl="1"/>
-            <a:r>
-              <a:rPr lang="en-US" dirty="0"/>
-              <a:t>Goal is to Minimize Mean Square Error (bias² + variance)</a:t>
-            </a:r>
-          </a:p>
-          <a:p>
-            <a:pPr lvl="1"/>
-            <a:endParaRPr lang="en-US" dirty="0"/>
-          </a:p>
-          <a:p>
-            <a:pPr lvl="1"/>
-            <a:endParaRPr lang="en-US" dirty="0"/>
-          </a:p>
-          <a:p>
-            <a:pPr lvl="1"/>
-            <a:endParaRPr lang="nl-NL" dirty="0"/>
-          </a:p>
-        </p:txBody>
-      </p:sp>
-    </p:spTree>
-    <p:extLst>
-      <p:ext uri="{BB962C8B-B14F-4D97-AF65-F5344CB8AC3E}">
-        <p14:creationId xmlns:p14="http://schemas.microsoft.com/office/powerpoint/2010/main" val="2138226708"/>
-      </p:ext>
-    </p:extLst>
-  </p:cSld>
-  <p:clrMapOvr>
-    <a:masterClrMapping/>
-  </p:clrMapOvr>
-</p:sld>
-</file>
-
-<file path=ppt/slides/slide21.xml><?xml version="1.0" encoding="utf-8"?>
 <p:sld xmlns:a="http://schemas.openxmlformats.org/drawingml/2006/main" xmlns:r="http://schemas.openxmlformats.org/officeDocument/2006/relationships" xmlns:p="http://schemas.openxmlformats.org/presentationml/2006/main">
   <p:cSld>
     <p:spTree>
@@ -7751,14 +7623,14 @@
           </a:ln>
           <a:extLst>
             <a:ext uri="{909E8E84-426E-40dd-AFC4-6F175D3DCCD1}">
-              <a14:hiddenFill xmlns="" xmlns:a14="http://schemas.microsoft.com/office/drawing/2010/main">
+              <a14:hiddenFill xmlns:a14="http://schemas.microsoft.com/office/drawing/2010/main" xmlns="">
                 <a:solidFill>
                   <a:schemeClr val="accent1"/>
                 </a:solidFill>
               </a14:hiddenFill>
             </a:ext>
             <a:ext uri="{91240B29-F687-4f45-9708-019B960494DF}">
-              <a14:hiddenLine xmlns="" xmlns:a14="http://schemas.microsoft.com/office/drawing/2010/main" w="9525">
+              <a14:hiddenLine xmlns:a14="http://schemas.microsoft.com/office/drawing/2010/main" xmlns="" w="9525">
                 <a:solidFill>
                   <a:schemeClr val="tx1"/>
                 </a:solidFill>
@@ -7805,14 +7677,14 @@
           </a:ln>
           <a:extLst>
             <a:ext uri="{909E8E84-426E-40dd-AFC4-6F175D3DCCD1}">
-              <a14:hiddenFill xmlns="" xmlns:a14="http://schemas.microsoft.com/office/drawing/2010/main">
+              <a14:hiddenFill xmlns:a14="http://schemas.microsoft.com/office/drawing/2010/main" xmlns="">
                 <a:solidFill>
                   <a:schemeClr val="accent1"/>
                 </a:solidFill>
               </a14:hiddenFill>
             </a:ext>
             <a:ext uri="{91240B29-F687-4f45-9708-019B960494DF}">
-              <a14:hiddenLine xmlns="" xmlns:a14="http://schemas.microsoft.com/office/drawing/2010/main" w="9525">
+              <a14:hiddenLine xmlns:a14="http://schemas.microsoft.com/office/drawing/2010/main" xmlns="" w="9525">
                 <a:solidFill>
                   <a:schemeClr val="tx1"/>
                 </a:solidFill>
@@ -8059,7 +7931,7 @@
 </p:sld>
 </file>
 
-<file path=ppt/slides/slide22.xml><?xml version="1.0" encoding="utf-8"?>
+<file path=ppt/slides/slide21.xml><?xml version="1.0" encoding="utf-8"?>
 <p:sld xmlns:a="http://schemas.openxmlformats.org/drawingml/2006/main" xmlns:r="http://schemas.openxmlformats.org/officeDocument/2006/relationships" xmlns:p="http://schemas.openxmlformats.org/presentationml/2006/main">
   <p:cSld>
     <p:spTree>
@@ -8111,13 +7983,26 @@
         <p:spPr/>
         <p:txBody>
           <a:bodyPr>
-            <a:normAutofit fontScale="92500" lnSpcReduction="20000"/>
+            <a:normAutofit fontScale="85000" lnSpcReduction="20000"/>
           </a:bodyPr>
           <a:lstStyle/>
           <a:p>
             <a:r>
               <a:rPr lang="en-US" dirty="0"/>
               <a:t>Next week:</a:t>
+            </a:r>
+          </a:p>
+          <a:p>
+            <a:pPr lvl="1"/>
+            <a:r>
+              <a:rPr lang="en-US" dirty="0"/>
+              <a:t>In two weeks: class-free week</a:t>
+            </a:r>
+          </a:p>
+          <a:p>
+            <a:r>
+              <a:rPr lang="en-US" dirty="0"/>
+              <a:t>In two weeks:</a:t>
             </a:r>
           </a:p>
           <a:p>
@@ -8182,25 +8067,18 @@
             <a:pPr lvl="1"/>
             <a:r>
               <a:rPr lang="en-US" dirty="0"/>
-              <a:t>In two weeks: class-free week</a:t>
+              <a:t>Assignment 1 online </a:t>
             </a:r>
           </a:p>
           <a:p>
             <a:pPr lvl="1"/>
-            <a:r>
-              <a:rPr lang="en-US" dirty="0"/>
-              <a:t>Assignment 1 online tonight</a:t>
-            </a:r>
-          </a:p>
-          <a:p>
-            <a:pPr lvl="2"/>
             <a:r>
               <a:rPr lang="en-US" dirty="0">
                 <a:solidFill>
                   <a:srgbClr val="FF0000"/>
                 </a:solidFill>
               </a:rPr>
-              <a:t>Deadline: 20 October 17:00</a:t>
+              <a:t>Deadline: 28 October 17:00</a:t>
             </a:r>
           </a:p>
           <a:p>
@@ -8234,7 +8112,7 @@
           <a:p>
             <a:fld id="{020E0409-E04F-4430-A784-C1A9179F1034}" type="slidenum">
               <a:rPr lang="nl-NL" smtClean="0"/>
-              <a:t>22</a:t>
+              <a:t>21</a:t>
             </a:fld>
             <a:endParaRPr lang="nl-NL" dirty="0"/>
           </a:p>
@@ -8314,7 +8192,7 @@
         <p:spPr>
           <a:xfrm>
             <a:off x="539551" y="332656"/>
-            <a:ext cx="2160241" cy="923330"/>
+            <a:ext cx="2520281" cy="2031325"/>
           </a:xfrm>
           <a:prstGeom prst="rect">
             <a:avLst/>
@@ -8338,7 +8216,52 @@
             </a:r>
           </a:p>
           <a:p>
-            <a:endParaRPr lang="nl-NL" dirty="0"/>
+            <a:r>
+              <a:rPr lang="en-US" dirty="0">
+                <a:solidFill>
+                  <a:srgbClr val="00B0F0"/>
+                </a:solidFill>
+              </a:rPr>
+              <a:t>What is my population?</a:t>
+            </a:r>
+          </a:p>
+          <a:p>
+            <a:pPr marL="285750" indent="-285750">
+              <a:buFont typeface="Arial" panose="020B0604020202020204" pitchFamily="34" charset="0"/>
+              <a:buChar char="•"/>
+            </a:pPr>
+            <a:r>
+              <a:rPr lang="en-US" dirty="0">
+                <a:solidFill>
+                  <a:srgbClr val="00B0F0"/>
+                </a:solidFill>
+              </a:rPr>
+              <a:t>What modes are acceptable?</a:t>
+            </a:r>
+          </a:p>
+          <a:p>
+            <a:r>
+              <a:rPr lang="en-US" dirty="0">
+                <a:solidFill>
+                  <a:srgbClr val="00B0F0"/>
+                </a:solidFill>
+              </a:rPr>
+              <a:t>What is my question?</a:t>
+            </a:r>
+          </a:p>
+          <a:p>
+            <a:pPr marL="285750" indent="-285750">
+              <a:buFont typeface="Arial" panose="020B0604020202020204" pitchFamily="34" charset="0"/>
+              <a:buChar char="•"/>
+            </a:pPr>
+            <a:r>
+              <a:rPr lang="en-US" dirty="0">
+                <a:solidFill>
+                  <a:srgbClr val="00B0F0"/>
+                </a:solidFill>
+              </a:rPr>
+              <a:t>Measurement error</a:t>
+            </a:r>
           </a:p>
         </p:txBody>
       </p:sp>
@@ -8406,6 +8329,7 @@
             </a:extLst>
           </p:cNvPr>
           <p:cNvCxnSpPr>
+            <a:cxnSpLocks/>
             <a:stCxn id="6" idx="1"/>
             <a:endCxn id="5" idx="3"/>
           </p:cNvCxnSpPr>
@@ -8413,8 +8337,8 @@
         </p:nvCxnSpPr>
         <p:spPr>
           <a:xfrm flipH="1">
-            <a:off x="2699792" y="794321"/>
-            <a:ext cx="2376264" cy="0"/>
+            <a:off x="3059832" y="794321"/>
+            <a:ext cx="2016224" cy="553998"/>
           </a:xfrm>
           <a:prstGeom prst="straightConnector1">
             <a:avLst/>

</xml_diff>

<commit_message>
updates to SDA structure and week 7
</commit_message>
<xml_diff>
--- a/static/files/SDA/week6/lecture_week_6.pptx
+++ b/static/files/SDA/week6/lecture_week_6.pptx
@@ -3869,8 +3869,8 @@
           <a:chExt cx="0" cy="0"/>
         </a:xfrm>
       </p:grpSpPr>
-      <mc:AlternateContent xmlns:mc="http://schemas.openxmlformats.org/markup-compatibility/2006">
-        <mc:Choice xmlns:a14="http://schemas.microsoft.com/office/drawing/2010/main" Requires="a14">
+      <mc:AlternateContent xmlns:mc="http://schemas.openxmlformats.org/markup-compatibility/2006" xmlns:a14="http://schemas.microsoft.com/office/drawing/2010/main">
+        <mc:Choice Requires="a14">
           <p:sp>
             <p:nvSpPr>
               <p:cNvPr id="3" name="Tijdelijke aanduiding voor inhoud 2"/>
@@ -4273,7 +4273,7 @@
             </p:txBody>
           </p:sp>
         </mc:Choice>
-        <mc:Fallback>
+        <mc:Fallback xmlns="">
           <p:sp>
             <p:nvSpPr>
               <p:cNvPr id="3" name="Tijdelijke aanduiding voor inhoud 2"/>
@@ -5145,14 +5145,14 @@
           </a:ln>
           <a:extLst>
             <a:ext uri="{909E8E84-426E-40dd-AFC4-6F175D3DCCD1}">
-              <a14:hiddenFill xmlns:a14="http://schemas.microsoft.com/office/drawing/2010/main" xmlns="">
+              <a14:hiddenFill xmlns="" xmlns:a14="http://schemas.microsoft.com/office/drawing/2010/main">
                 <a:solidFill>
                   <a:schemeClr val="accent1"/>
                 </a:solidFill>
               </a14:hiddenFill>
             </a:ext>
             <a:ext uri="{91240B29-F687-4f45-9708-019B960494DF}">
-              <a14:hiddenLine xmlns:a14="http://schemas.microsoft.com/office/drawing/2010/main" xmlns="" w="9525">
+              <a14:hiddenLine xmlns="" xmlns:a14="http://schemas.microsoft.com/office/drawing/2010/main" w="9525">
                 <a:solidFill>
                   <a:schemeClr val="tx1"/>
                 </a:solidFill>
@@ -5386,14 +5386,14 @@
           </a:ln>
           <a:extLst>
             <a:ext uri="{909E8E84-426E-40dd-AFC4-6F175D3DCCD1}">
-              <a14:hiddenFill xmlns:a14="http://schemas.microsoft.com/office/drawing/2010/main" xmlns="">
+              <a14:hiddenFill xmlns="" xmlns:a14="http://schemas.microsoft.com/office/drawing/2010/main">
                 <a:solidFill>
                   <a:schemeClr val="accent1"/>
                 </a:solidFill>
               </a14:hiddenFill>
             </a:ext>
             <a:ext uri="{91240B29-F687-4f45-9708-019B960494DF}">
-              <a14:hiddenLine xmlns:a14="http://schemas.microsoft.com/office/drawing/2010/main" xmlns="" w="9525">
+              <a14:hiddenLine xmlns="" xmlns:a14="http://schemas.microsoft.com/office/drawing/2010/main" w="9525">
                 <a:solidFill>
                   <a:schemeClr val="tx1"/>
                 </a:solidFill>
@@ -5580,14 +5580,14 @@
           </a:ln>
           <a:extLst>
             <a:ext uri="{909E8E84-426E-40dd-AFC4-6F175D3DCCD1}">
-              <a14:hiddenFill xmlns:a14="http://schemas.microsoft.com/office/drawing/2010/main" xmlns="">
+              <a14:hiddenFill xmlns="" xmlns:a14="http://schemas.microsoft.com/office/drawing/2010/main">
                 <a:solidFill>
                   <a:schemeClr val="accent1"/>
                 </a:solidFill>
               </a14:hiddenFill>
             </a:ext>
             <a:ext uri="{91240B29-F687-4f45-9708-019B960494DF}">
-              <a14:hiddenLine xmlns:a14="http://schemas.microsoft.com/office/drawing/2010/main" xmlns="" w="9525">
+              <a14:hiddenLine xmlns="" xmlns:a14="http://schemas.microsoft.com/office/drawing/2010/main" w="9525">
                 <a:solidFill>
                   <a:schemeClr val="tx1"/>
                 </a:solidFill>
@@ -5936,14 +5936,14 @@
           </a:ln>
           <a:extLst>
             <a:ext uri="{909E8E84-426E-40dd-AFC4-6F175D3DCCD1}">
-              <a14:hiddenFill xmlns:a14="http://schemas.microsoft.com/office/drawing/2010/main" xmlns="">
+              <a14:hiddenFill xmlns="" xmlns:a14="http://schemas.microsoft.com/office/drawing/2010/main">
                 <a:solidFill>
                   <a:schemeClr val="accent1"/>
                 </a:solidFill>
               </a14:hiddenFill>
             </a:ext>
             <a:ext uri="{91240B29-F687-4f45-9708-019B960494DF}">
-              <a14:hiddenLine xmlns:a14="http://schemas.microsoft.com/office/drawing/2010/main" xmlns="" w="9525">
+              <a14:hiddenLine xmlns="" xmlns:a14="http://schemas.microsoft.com/office/drawing/2010/main" w="9525">
                 <a:solidFill>
                   <a:schemeClr val="tx1"/>
                 </a:solidFill>
@@ -6294,14 +6294,14 @@
           </a:ln>
           <a:extLst>
             <a:ext uri="{909E8E84-426E-40dd-AFC4-6F175D3DCCD1}">
-              <a14:hiddenFill xmlns:a14="http://schemas.microsoft.com/office/drawing/2010/main" xmlns="">
+              <a14:hiddenFill xmlns="" xmlns:a14="http://schemas.microsoft.com/office/drawing/2010/main">
                 <a:solidFill>
                   <a:schemeClr val="accent1"/>
                 </a:solidFill>
               </a14:hiddenFill>
             </a:ext>
             <a:ext uri="{91240B29-F687-4f45-9708-019B960494DF}">
-              <a14:hiddenLine xmlns:a14="http://schemas.microsoft.com/office/drawing/2010/main" xmlns="" w="9525">
+              <a14:hiddenLine xmlns="" xmlns:a14="http://schemas.microsoft.com/office/drawing/2010/main" w="9525">
                 <a:solidFill>
                   <a:schemeClr val="tx1"/>
                 </a:solidFill>
@@ -6771,14 +6771,14 @@
           </a:ln>
           <a:extLst>
             <a:ext uri="{909E8E84-426E-40dd-AFC4-6F175D3DCCD1}">
-              <a14:hiddenFill xmlns:a14="http://schemas.microsoft.com/office/drawing/2010/main" xmlns="">
+              <a14:hiddenFill xmlns="" xmlns:a14="http://schemas.microsoft.com/office/drawing/2010/main">
                 <a:solidFill>
                   <a:schemeClr val="accent1"/>
                 </a:solidFill>
               </a14:hiddenFill>
             </a:ext>
             <a:ext uri="{91240B29-F687-4f45-9708-019B960494DF}">
-              <a14:hiddenLine xmlns:a14="http://schemas.microsoft.com/office/drawing/2010/main" xmlns="" w="9525">
+              <a14:hiddenLine xmlns="" xmlns:a14="http://schemas.microsoft.com/office/drawing/2010/main" w="9525">
                 <a:solidFill>
                   <a:schemeClr val="tx1"/>
                 </a:solidFill>
@@ -7623,14 +7623,14 @@
           </a:ln>
           <a:extLst>
             <a:ext uri="{909E8E84-426E-40dd-AFC4-6F175D3DCCD1}">
-              <a14:hiddenFill xmlns:a14="http://schemas.microsoft.com/office/drawing/2010/main" xmlns="">
+              <a14:hiddenFill xmlns="" xmlns:a14="http://schemas.microsoft.com/office/drawing/2010/main">
                 <a:solidFill>
                   <a:schemeClr val="accent1"/>
                 </a:solidFill>
               </a14:hiddenFill>
             </a:ext>
             <a:ext uri="{91240B29-F687-4f45-9708-019B960494DF}">
-              <a14:hiddenLine xmlns:a14="http://schemas.microsoft.com/office/drawing/2010/main" xmlns="" w="9525">
+              <a14:hiddenLine xmlns="" xmlns:a14="http://schemas.microsoft.com/office/drawing/2010/main" w="9525">
                 <a:solidFill>
                   <a:schemeClr val="tx1"/>
                 </a:solidFill>
@@ -7677,14 +7677,14 @@
           </a:ln>
           <a:extLst>
             <a:ext uri="{909E8E84-426E-40dd-AFC4-6F175D3DCCD1}">
-              <a14:hiddenFill xmlns:a14="http://schemas.microsoft.com/office/drawing/2010/main" xmlns="">
+              <a14:hiddenFill xmlns="" xmlns:a14="http://schemas.microsoft.com/office/drawing/2010/main">
                 <a:solidFill>
                   <a:schemeClr val="accent1"/>
                 </a:solidFill>
               </a14:hiddenFill>
             </a:ext>
             <a:ext uri="{91240B29-F687-4f45-9708-019B960494DF}">
-              <a14:hiddenLine xmlns:a14="http://schemas.microsoft.com/office/drawing/2010/main" xmlns="" w="9525">
+              <a14:hiddenLine xmlns="" xmlns:a14="http://schemas.microsoft.com/office/drawing/2010/main" w="9525">
                 <a:solidFill>
                   <a:schemeClr val="tx1"/>
                 </a:solidFill>
@@ -8078,7 +8078,23 @@
                   <a:srgbClr val="FF0000"/>
                 </a:solidFill>
               </a:rPr>
-              <a:t>Deadline: 28 October 17:00</a:t>
+              <a:t>Deadline</a:t>
+            </a:r>
+            <a:r>
+              <a:rPr lang="en-US">
+                <a:solidFill>
+                  <a:srgbClr val="FF0000"/>
+                </a:solidFill>
+              </a:rPr>
+              <a:t>: 21 </a:t>
+            </a:r>
+            <a:r>
+              <a:rPr lang="en-US" dirty="0">
+                <a:solidFill>
+                  <a:srgbClr val="FF0000"/>
+                </a:solidFill>
+              </a:rPr>
+              <a:t>October 17:00</a:t>
             </a:r>
           </a:p>
           <a:p>

</xml_diff>